<commit_message>
update: finishing touches for ppt
</commit_message>
<xml_diff>
--- a/docs/zwischenpräsentation.pptx
+++ b/docs/zwischenpräsentation.pptx
@@ -5,23 +5,22 @@
     <p:sldMasterId id="2147483648" r:id="rId4"/>
   </p:sldMasterIdLst>
   <p:notesMasterIdLst>
-    <p:notesMasterId r:id="rId16"/>
+    <p:notesMasterId r:id="rId15"/>
   </p:notesMasterIdLst>
   <p:handoutMasterIdLst>
-    <p:handoutMasterId r:id="rId17"/>
+    <p:handoutMasterId r:id="rId16"/>
   </p:handoutMasterIdLst>
   <p:sldIdLst>
     <p:sldId id="285" r:id="rId5"/>
     <p:sldId id="277" r:id="rId6"/>
     <p:sldId id="261" r:id="rId7"/>
-    <p:sldId id="295" r:id="rId8"/>
-    <p:sldId id="262" r:id="rId9"/>
-    <p:sldId id="296" r:id="rId10"/>
-    <p:sldId id="299" r:id="rId11"/>
-    <p:sldId id="298" r:id="rId12"/>
-    <p:sldId id="297" r:id="rId13"/>
-    <p:sldId id="300" r:id="rId14"/>
-    <p:sldId id="301" r:id="rId15"/>
+    <p:sldId id="262" r:id="rId8"/>
+    <p:sldId id="296" r:id="rId9"/>
+    <p:sldId id="299" r:id="rId10"/>
+    <p:sldId id="298" r:id="rId11"/>
+    <p:sldId id="302" r:id="rId12"/>
+    <p:sldId id="300" r:id="rId13"/>
+    <p:sldId id="301" r:id="rId14"/>
   </p:sldIdLst>
   <p:sldSz cx="12192000" cy="6858000"/>
   <p:notesSz cx="6858000" cy="9144000"/>
@@ -260,7 +259,7 @@
           <a:p>
             <a:fld id="{2F37E1B8-528F-4D87-8EBD-B843BAE2C861}" type="datetimeFigureOut">
               <a:rPr lang="en-US" smtClean="0"/>
-              <a:t>2/1/24</a:t>
+              <a:t>2/1/2024</a:t>
             </a:fld>
             <a:endParaRPr lang="en-US" dirty="0"/>
           </a:p>
@@ -452,7 +451,7 @@
           <a:p>
             <a:fld id="{740E576D-777F-42E1-9739-7FD89F404092}" type="datetimeFigureOut">
               <a:rPr lang="en-US" smtClean="0"/>
-              <a:t>2/1/24</a:t>
+              <a:t>2/1/2024</a:t>
             </a:fld>
             <a:endParaRPr lang="en-US" dirty="0"/>
           </a:p>
@@ -610,7 +609,7 @@
           <a:p>
             <a:fld id="{4F4F1A11-BB96-443E-B274-982C61AA7E0D}" type="slidenum">
               <a:rPr lang="en-US" smtClean="0"/>
-              <a:t>‹#›</a:t>
+              <a:t>‹Nr.›</a:t>
             </a:fld>
             <a:endParaRPr lang="en-US" dirty="0"/>
           </a:p>
@@ -1887,7 +1886,7 @@
           <a:p>
             <a:fld id="{B5CEABB6-07DC-46E8-9B57-56EC44A396E5}" type="slidenum">
               <a:rPr lang="en-US" smtClean="0"/>
-              <a:t>‹#›</a:t>
+              <a:t>‹Nr.›</a:t>
             </a:fld>
             <a:endParaRPr lang="en-US" dirty="0"/>
           </a:p>
@@ -2644,7 +2643,7 @@
           <a:p>
             <a:fld id="{9FF96520-E4CE-4EAD-8ABF-1D2297D6B3AA}" type="slidenum">
               <a:rPr lang="en-US" smtClean="0"/>
-              <a:t>‹#›</a:t>
+              <a:t>‹Nr.›</a:t>
             </a:fld>
             <a:endParaRPr lang="en-US" dirty="0"/>
           </a:p>
@@ -2948,7 +2947,7 @@
           <a:p>
             <a:fld id="{9FF96520-E4CE-4EAD-8ABF-1D2297D6B3AA}" type="slidenum">
               <a:rPr lang="en-US" smtClean="0"/>
-              <a:t>‹#›</a:t>
+              <a:t>‹Nr.›</a:t>
             </a:fld>
             <a:endParaRPr lang="en-US" dirty="0"/>
           </a:p>
@@ -3507,7 +3506,7 @@
           <a:p>
             <a:fld id="{B5CEABB6-07DC-46E8-9B57-56EC44A396E5}" type="slidenum">
               <a:rPr lang="en-US" smtClean="0"/>
-              <a:t>‹#›</a:t>
+              <a:t>‹Nr.›</a:t>
             </a:fld>
             <a:endParaRPr lang="en-US" dirty="0"/>
           </a:p>
@@ -4056,7 +4055,7 @@
           <a:p>
             <a:fld id="{9FF96520-E4CE-4EAD-8ABF-1D2297D6B3AA}" type="slidenum">
               <a:rPr lang="en-US" smtClean="0"/>
-              <a:t>‹#›</a:t>
+              <a:t>‹Nr.›</a:t>
             </a:fld>
             <a:endParaRPr lang="en-US" dirty="0"/>
           </a:p>
@@ -4465,7 +4464,7 @@
           <a:p>
             <a:fld id="{9FF96520-E4CE-4EAD-8ABF-1D2297D6B3AA}" type="slidenum">
               <a:rPr lang="en-US" smtClean="0"/>
-              <a:t>‹#›</a:t>
+              <a:t>‹Nr.›</a:t>
             </a:fld>
             <a:endParaRPr lang="en-US" dirty="0"/>
           </a:p>
@@ -4732,7 +4731,7 @@
           <a:p>
             <a:fld id="{9FF96520-E4CE-4EAD-8ABF-1D2297D6B3AA}" type="slidenum">
               <a:rPr lang="en-US" smtClean="0"/>
-              <a:t>‹#›</a:t>
+              <a:t>‹Nr.›</a:t>
             </a:fld>
             <a:endParaRPr lang="en-US" dirty="0"/>
           </a:p>
@@ -5226,7 +5225,7 @@
           <a:p>
             <a:fld id="{9FF96520-E4CE-4EAD-8ABF-1D2297D6B3AA}" type="slidenum">
               <a:rPr lang="en-US" smtClean="0"/>
-              <a:t>‹#›</a:t>
+              <a:t>‹Nr.›</a:t>
             </a:fld>
             <a:endParaRPr lang="en-US" dirty="0"/>
           </a:p>
@@ -6452,7 +6451,7 @@
           <a:p>
             <a:fld id="{9FF96520-E4CE-4EAD-8ABF-1D2297D6B3AA}" type="slidenum">
               <a:rPr lang="en-US" smtClean="0"/>
-              <a:t>‹#›</a:t>
+              <a:t>‹Nr.›</a:t>
             </a:fld>
             <a:endParaRPr lang="en-US" dirty="0"/>
           </a:p>
@@ -7436,7 +7435,7 @@
           <a:p>
             <a:fld id="{B5CEABB6-07DC-46E8-9B57-56EC44A396E5}" type="slidenum">
               <a:rPr lang="en-US" smtClean="0"/>
-              <a:t>‹#›</a:t>
+              <a:t>‹Nr.›</a:t>
             </a:fld>
             <a:endParaRPr lang="en-US" dirty="0"/>
           </a:p>
@@ -8890,7 +8889,7 @@
             <a:fld id="{9FF96520-E4CE-4EAD-8ABF-1D2297D6B3AA}" type="slidenum">
               <a:rPr lang="en-US" smtClean="0"/>
               <a:pPr/>
-              <a:t>‹#›</a:t>
+              <a:t>‹Nr.›</a:t>
             </a:fld>
             <a:endParaRPr lang="en-US" dirty="0"/>
           </a:p>
@@ -9307,7 +9306,7 @@
           <a:p>
             <a:fld id="{9FF96520-E4CE-4EAD-8ABF-1D2297D6B3AA}" type="slidenum">
               <a:rPr lang="en-US" smtClean="0"/>
-              <a:t>‹#›</a:t>
+              <a:t>‹Nr.›</a:t>
             </a:fld>
             <a:endParaRPr lang="en-US" dirty="0"/>
           </a:p>
@@ -9739,7 +9738,7 @@
             <a:fld id="{B5CEABB6-07DC-46E8-9B57-56EC44A396E5}" type="slidenum">
               <a:rPr lang="en-US" smtClean="0"/>
               <a:pPr/>
-              <a:t>‹#›</a:t>
+              <a:t>‹Nr.›</a:t>
             </a:fld>
             <a:endParaRPr lang="en-US" dirty="0"/>
           </a:p>
@@ -10345,7 +10344,7 @@
             <a:fld id="{9FF96520-E4CE-4EAD-8ABF-1D2297D6B3AA}" type="slidenum">
               <a:rPr lang="en-US" smtClean="0"/>
               <a:pPr/>
-              <a:t>‹#›</a:t>
+              <a:t>‹Nr.›</a:t>
             </a:fld>
             <a:endParaRPr lang="en-US" dirty="0"/>
           </a:p>
@@ -10850,7 +10849,7 @@
           <a:p>
             <a:fld id="{B5CEABB6-07DC-46E8-9B57-56EC44A396E5}" type="slidenum">
               <a:rPr lang="en-US" smtClean="0"/>
-              <a:t>‹#›</a:t>
+              <a:t>‹Nr.›</a:t>
             </a:fld>
             <a:endParaRPr lang="en-US" dirty="0"/>
           </a:p>
@@ -11452,7 +11451,7 @@
           <a:p>
             <a:fld id="{B5CEABB6-07DC-46E8-9B57-56EC44A396E5}" type="slidenum">
               <a:rPr lang="en-US" smtClean="0"/>
-              <a:t>‹#›</a:t>
+              <a:t>‹Nr.›</a:t>
             </a:fld>
             <a:endParaRPr lang="en-US" dirty="0"/>
           </a:p>
@@ -12168,7 +12167,7 @@
           <a:p>
             <a:fld id="{B5CEABB6-07DC-46E8-9B57-56EC44A396E5}" type="slidenum">
               <a:rPr lang="en-US" smtClean="0"/>
-              <a:t>‹#›</a:t>
+              <a:t>‹Nr.›</a:t>
             </a:fld>
             <a:endParaRPr lang="en-US" dirty="0"/>
           </a:p>
@@ -12588,7 +12587,7 @@
           <a:p>
             <a:fld id="{9FF96520-E4CE-4EAD-8ABF-1D2297D6B3AA}" type="slidenum">
               <a:rPr lang="en-US" smtClean="0"/>
-              <a:t>‹#›</a:t>
+              <a:t>‹Nr.›</a:t>
             </a:fld>
             <a:endParaRPr lang="en-US" dirty="0"/>
           </a:p>
@@ -14012,7 +14011,7 @@
           <a:p>
             <a:fld id="{B5CEABB6-07DC-46E8-9B57-56EC44A396E5}" type="slidenum">
               <a:rPr lang="en-US" smtClean="0"/>
-              <a:t>‹#›</a:t>
+              <a:t>‹Nr.›</a:t>
             </a:fld>
             <a:endParaRPr lang="en-US" dirty="0"/>
           </a:p>
@@ -14296,7 +14295,7 @@
             <a:fld id="{9FF96520-E4CE-4EAD-8ABF-1D2297D6B3AA}" type="slidenum">
               <a:rPr lang="en-US" smtClean="0"/>
               <a:pPr/>
-              <a:t>‹#›</a:t>
+              <a:t>‹Nr.›</a:t>
             </a:fld>
             <a:endParaRPr lang="en-US" dirty="0"/>
           </a:p>
@@ -15831,1218 +15830,6 @@
         <p:cNvPr id="1" name="">
           <a:extLst>
             <a:ext uri="{FF2B5EF4-FFF2-40B4-BE49-F238E27FC236}">
-              <a16:creationId xmlns:a16="http://schemas.microsoft.com/office/drawing/2014/main" id="{49435192-82FE-9DF4-4D50-0CE1D37BFC22}"/>
-            </a:ext>
-          </a:extLst>
-        </p:cNvPr>
-        <p:cNvGrpSpPr/>
-        <p:nvPr/>
-      </p:nvGrpSpPr>
-      <p:grpSpPr>
-        <a:xfrm>
-          <a:off x="0" y="0"/>
-          <a:ext cx="0" cy="0"/>
-          <a:chOff x="0" y="0"/>
-          <a:chExt cx="0" cy="0"/>
-        </a:xfrm>
-      </p:grpSpPr>
-      <p:pic>
-        <p:nvPicPr>
-          <p:cNvPr id="13" name="Bildplatzhalter 12" descr="Ein Bild, das Schachfigur, Statue, Messing, Skulptur enthält.&#10;&#10;Beschreibung automatisch generiert.">
-            <a:extLst>
-              <a:ext uri="{FF2B5EF4-FFF2-40B4-BE49-F238E27FC236}">
-                <a16:creationId xmlns:a16="http://schemas.microsoft.com/office/drawing/2014/main" id="{A3F69BDF-A435-86EF-99F1-C5BA62DE993F}"/>
-              </a:ext>
-            </a:extLst>
-          </p:cNvPr>
-          <p:cNvPicPr>
-            <a:picLocks noGrp="1" noChangeAspect="1"/>
-          </p:cNvPicPr>
-          <p:nvPr>
-            <p:ph type="pic" sz="quarter" idx="13"/>
-          </p:nvPr>
-        </p:nvPicPr>
-        <p:blipFill>
-          <a:blip r:embed="rId2"/>
-          <a:srcRect t="21875" b="21875"/>
-          <a:stretch/>
-        </p:blipFill>
-        <p:spPr>
-          <a:xfrm>
-            <a:off x="0" y="0"/>
-            <a:ext cx="12192000" cy="6858000"/>
-          </a:xfrm>
-        </p:spPr>
-      </p:pic>
-      <p:sp>
-        <p:nvSpPr>
-          <p:cNvPr id="9" name="Rectangle 8">
-            <a:extLst>
-              <a:ext uri="{FF2B5EF4-FFF2-40B4-BE49-F238E27FC236}">
-                <a16:creationId xmlns:a16="http://schemas.microsoft.com/office/drawing/2014/main" id="{2144EBB6-D3CB-8277-789D-E227FAC97602}"/>
-              </a:ext>
-            </a:extLst>
-          </p:cNvPr>
-          <p:cNvSpPr/>
-          <p:nvPr/>
-        </p:nvSpPr>
-        <p:spPr>
-          <a:xfrm>
-            <a:off x="-379828" y="-436098"/>
-            <a:ext cx="13111090" cy="7779433"/>
-          </a:xfrm>
-          <a:prstGeom prst="rect">
-            <a:avLst/>
-          </a:prstGeom>
-          <a:solidFill>
-            <a:schemeClr val="bg1">
-              <a:alpha val="90000"/>
-            </a:schemeClr>
-          </a:solidFill>
-        </p:spPr>
-        <p:style>
-          <a:lnRef idx="2">
-            <a:schemeClr val="accent1">
-              <a:shade val="15000"/>
-            </a:schemeClr>
-          </a:lnRef>
-          <a:fillRef idx="1">
-            <a:schemeClr val="accent1"/>
-          </a:fillRef>
-          <a:effectRef idx="0">
-            <a:schemeClr val="accent1"/>
-          </a:effectRef>
-          <a:fontRef idx="minor">
-            <a:schemeClr val="lt1"/>
-          </a:fontRef>
-        </p:style>
-        <p:txBody>
-          <a:bodyPr rtlCol="0" anchor="ctr"/>
-          <a:lstStyle/>
-          <a:p>
-            <a:pPr algn="ctr"/>
-            <a:endParaRPr lang="en-DE"/>
-          </a:p>
-        </p:txBody>
-      </p:sp>
-      <p:sp>
-        <p:nvSpPr>
-          <p:cNvPr id="20" name="Text Placeholder 19">
-            <a:extLst>
-              <a:ext uri="{FF2B5EF4-FFF2-40B4-BE49-F238E27FC236}">
-                <a16:creationId xmlns:a16="http://schemas.microsoft.com/office/drawing/2014/main" id="{9D59C9AB-2123-86FD-727D-1494F6F55DE4}"/>
-              </a:ext>
-            </a:extLst>
-          </p:cNvPr>
-          <p:cNvSpPr>
-            <a:spLocks noGrp="1"/>
-          </p:cNvSpPr>
-          <p:nvPr>
-            <p:ph type="body" sz="quarter" idx="17"/>
-          </p:nvPr>
-        </p:nvSpPr>
-        <p:spPr>
-          <a:xfrm>
-            <a:off x="4165451" y="1269416"/>
-            <a:ext cx="1598515" cy="1681163"/>
-          </a:xfrm>
-        </p:spPr>
-        <p:txBody>
-          <a:bodyPr vert="horz" lIns="91440" tIns="45720" rIns="91440" bIns="45720" rtlCol="0" anchor="t">
-            <a:noAutofit/>
-          </a:bodyPr>
-          <a:lstStyle/>
-          <a:p>
-            <a:r>
-              <a:rPr lang="en-US" dirty="0"/>
-              <a:t>S</a:t>
-            </a:r>
-          </a:p>
-        </p:txBody>
-      </p:sp>
-      <p:sp>
-        <p:nvSpPr>
-          <p:cNvPr id="18" name="Text Placeholder 17">
-            <a:extLst>
-              <a:ext uri="{FF2B5EF4-FFF2-40B4-BE49-F238E27FC236}">
-                <a16:creationId xmlns:a16="http://schemas.microsoft.com/office/drawing/2014/main" id="{7DCA4D98-70E5-D0E4-BDA7-E2CEC1B13F1B}"/>
-              </a:ext>
-            </a:extLst>
-          </p:cNvPr>
-          <p:cNvSpPr>
-            <a:spLocks noGrp="1"/>
-          </p:cNvSpPr>
-          <p:nvPr>
-            <p:ph type="body" sz="quarter" idx="15"/>
-          </p:nvPr>
-        </p:nvSpPr>
-        <p:spPr>
-          <a:xfrm>
-            <a:off x="2827449" y="1330267"/>
-            <a:ext cx="1253665" cy="1681163"/>
-          </a:xfrm>
-        </p:spPr>
-        <p:txBody>
-          <a:bodyPr vert="horz" lIns="91440" tIns="45720" rIns="91440" bIns="45720" rtlCol="0" anchor="t">
-            <a:noAutofit/>
-          </a:bodyPr>
-          <a:lstStyle/>
-          <a:p>
-            <a:r>
-              <a:rPr lang="en-US" dirty="0"/>
-              <a:t>E</a:t>
-            </a:r>
-            <a:endParaRPr lang="en-US" dirty="0">
-              <a:ea typeface="Source Sans Pro"/>
-            </a:endParaRPr>
-          </a:p>
-        </p:txBody>
-      </p:sp>
-      <p:sp>
-        <p:nvSpPr>
-          <p:cNvPr id="17" name="Text Placeholder 16">
-            <a:extLst>
-              <a:ext uri="{FF2B5EF4-FFF2-40B4-BE49-F238E27FC236}">
-                <a16:creationId xmlns:a16="http://schemas.microsoft.com/office/drawing/2014/main" id="{594ACF0C-7D44-38B1-070B-A0749FC831A2}"/>
-              </a:ext>
-            </a:extLst>
-          </p:cNvPr>
-          <p:cNvSpPr>
-            <a:spLocks noGrp="1"/>
-          </p:cNvSpPr>
-          <p:nvPr>
-            <p:ph type="body" sz="quarter" idx="14"/>
-          </p:nvPr>
-        </p:nvSpPr>
-        <p:spPr>
-          <a:xfrm>
-            <a:off x="869501" y="490621"/>
-            <a:ext cx="1253665" cy="1681163"/>
-          </a:xfrm>
-        </p:spPr>
-        <p:txBody>
-          <a:bodyPr vert="horz" lIns="91440" tIns="45720" rIns="91440" bIns="45720" rtlCol="0" anchor="t">
-            <a:noAutofit/>
-          </a:bodyPr>
-          <a:lstStyle/>
-          <a:p>
-            <a:r>
-              <a:rPr lang="en-US" dirty="0">
-                <a:ea typeface="Source Sans Pro"/>
-              </a:rPr>
-              <a:t>C</a:t>
-            </a:r>
-          </a:p>
-        </p:txBody>
-      </p:sp>
-      <p:sp>
-        <p:nvSpPr>
-          <p:cNvPr id="19" name="Text Placeholder 18">
-            <a:extLst>
-              <a:ext uri="{FF2B5EF4-FFF2-40B4-BE49-F238E27FC236}">
-                <a16:creationId xmlns:a16="http://schemas.microsoft.com/office/drawing/2014/main" id="{F64FA16C-42F7-A1DA-6EDA-E373203B4747}"/>
-              </a:ext>
-            </a:extLst>
-          </p:cNvPr>
-          <p:cNvSpPr>
-            <a:spLocks noGrp="1"/>
-          </p:cNvSpPr>
-          <p:nvPr>
-            <p:ph type="body" sz="quarter" idx="16"/>
-          </p:nvPr>
-        </p:nvSpPr>
-        <p:spPr>
-          <a:xfrm>
-            <a:off x="3619153" y="991513"/>
-            <a:ext cx="1253665" cy="1681163"/>
-          </a:xfrm>
-        </p:spPr>
-        <p:txBody>
-          <a:bodyPr vert="horz" lIns="91440" tIns="45720" rIns="91440" bIns="45720" rtlCol="0" anchor="t">
-            <a:noAutofit/>
-          </a:bodyPr>
-          <a:lstStyle/>
-          <a:p>
-            <a:r>
-              <a:rPr lang="en-US" dirty="0"/>
-              <a:t>S</a:t>
-            </a:r>
-            <a:endParaRPr lang="en-US" dirty="0">
-              <a:ea typeface="Source Sans Pro"/>
-            </a:endParaRPr>
-          </a:p>
-        </p:txBody>
-      </p:sp>
-      <p:sp>
-        <p:nvSpPr>
-          <p:cNvPr id="32" name="Subtitle 31">
-            <a:extLst>
-              <a:ext uri="{FF2B5EF4-FFF2-40B4-BE49-F238E27FC236}">
-                <a16:creationId xmlns:a16="http://schemas.microsoft.com/office/drawing/2014/main" id="{C29C560E-6A10-3B13-D963-A8C7AD2841B7}"/>
-              </a:ext>
-            </a:extLst>
-          </p:cNvPr>
-          <p:cNvSpPr>
-            <a:spLocks noGrp="1"/>
-          </p:cNvSpPr>
-          <p:nvPr>
-            <p:ph type="subTitle" idx="1"/>
-          </p:nvPr>
-        </p:nvSpPr>
-        <p:spPr>
-          <a:xfrm>
-            <a:off x="7970418" y="5325276"/>
-            <a:ext cx="3677297" cy="682094"/>
-          </a:xfrm>
-        </p:spPr>
-        <p:txBody>
-          <a:bodyPr>
-            <a:normAutofit fontScale="85000" lnSpcReduction="20000"/>
-          </a:bodyPr>
-          <a:lstStyle/>
-          <a:p>
-            <a:r>
-              <a:rPr lang="en-US" dirty="0"/>
-              <a:t>Aaron </a:t>
-            </a:r>
-            <a:r>
-              <a:rPr lang="en-US" err="1"/>
-              <a:t>debebe</a:t>
-            </a:r>
-            <a:endParaRPr lang="en-US" dirty="0" err="1">
-              <a:ea typeface="Source Sans Pro"/>
-            </a:endParaRPr>
-          </a:p>
-          <a:p>
-            <a:r>
-              <a:rPr lang="en-US" dirty="0">
-                <a:ea typeface="Source Sans Pro"/>
-              </a:rPr>
-              <a:t>Constantin Schreyer</a:t>
-            </a:r>
-          </a:p>
-        </p:txBody>
-      </p:sp>
-      <p:cxnSp>
-        <p:nvCxnSpPr>
-          <p:cNvPr id="12" name="Straight Connector 11">
-            <a:extLst>
-              <a:ext uri="{FF2B5EF4-FFF2-40B4-BE49-F238E27FC236}">
-                <a16:creationId xmlns:a16="http://schemas.microsoft.com/office/drawing/2014/main" id="{AB95E5D3-8CE5-5BFC-5765-3934E0DD8B60}"/>
-              </a:ext>
-              <a:ext uri="{C183D7F6-B498-43B3-948B-1728B52AA6E4}">
-                <adec:decorative xmlns:adec="http://schemas.microsoft.com/office/drawing/2017/decorative" val="1"/>
-              </a:ext>
-            </a:extLst>
-          </p:cNvPr>
-          <p:cNvCxnSpPr>
-            <a:cxnSpLocks/>
-          </p:cNvCxnSpPr>
-          <p:nvPr/>
-        </p:nvCxnSpPr>
-        <p:spPr>
-          <a:xfrm flipH="1">
-            <a:off x="4245428" y="5655432"/>
-            <a:ext cx="3318888" cy="0"/>
-          </a:xfrm>
-          <a:prstGeom prst="line">
-            <a:avLst/>
-          </a:prstGeom>
-          <a:ln w="19050">
-            <a:solidFill>
-              <a:schemeClr val="accent1"/>
-            </a:solidFill>
-          </a:ln>
-        </p:spPr>
-        <p:style>
-          <a:lnRef idx="1">
-            <a:schemeClr val="accent1"/>
-          </a:lnRef>
-          <a:fillRef idx="0">
-            <a:schemeClr val="accent1"/>
-          </a:fillRef>
-          <a:effectRef idx="0">
-            <a:schemeClr val="accent1"/>
-          </a:effectRef>
-          <a:fontRef idx="minor">
-            <a:schemeClr val="tx1"/>
-          </a:fontRef>
-        </p:style>
-      </p:cxnSp>
-      <p:sp>
-        <p:nvSpPr>
-          <p:cNvPr id="3" name="Text Placeholder 16">
-            <a:extLst>
-              <a:ext uri="{FF2B5EF4-FFF2-40B4-BE49-F238E27FC236}">
-                <a16:creationId xmlns:a16="http://schemas.microsoft.com/office/drawing/2014/main" id="{30F3025A-BE2C-DD62-6B2D-153509AAC78B}"/>
-              </a:ext>
-            </a:extLst>
-          </p:cNvPr>
-          <p:cNvSpPr txBox="1">
-            <a:spLocks/>
-          </p:cNvSpPr>
-          <p:nvPr/>
-        </p:nvSpPr>
-        <p:spPr>
-          <a:xfrm>
-            <a:off x="1895803" y="850839"/>
-            <a:ext cx="1253665" cy="1681163"/>
-          </a:xfrm>
-          <a:prstGeom prst="rect">
-            <a:avLst/>
-          </a:prstGeom>
-        </p:spPr>
-        <p:txBody>
-          <a:bodyPr vert="horz" lIns="91440" tIns="45720" rIns="91440" bIns="45720" rtlCol="0" anchor="t">
-            <a:noAutofit/>
-          </a:bodyPr>
-          <a:lstStyle>
-            <a:lvl1pPr marL="0" indent="0" algn="l" defTabSz="914400" rtl="0" eaLnBrk="1" latinLnBrk="0" hangingPunct="1">
-              <a:lnSpc>
-                <a:spcPct val="90000"/>
-              </a:lnSpc>
-              <a:spcBef>
-                <a:spcPts val="1000"/>
-              </a:spcBef>
-              <a:buFont typeface="Arial" panose="020B0604020202020204" pitchFamily="34" charset="0"/>
-              <a:buNone/>
-              <a:defRPr sz="15500" b="1" kern="1200">
-                <a:solidFill>
-                  <a:schemeClr val="tx1"/>
-                </a:solidFill>
-                <a:latin typeface="+mn-lt"/>
-                <a:ea typeface="+mn-ea"/>
-                <a:cs typeface="+mn-cs"/>
-              </a:defRPr>
-            </a:lvl1pPr>
-            <a:lvl2pPr marL="685800" indent="-228600" algn="l" defTabSz="914400" rtl="0" eaLnBrk="1" latinLnBrk="0" hangingPunct="1">
-              <a:lnSpc>
-                <a:spcPct val="90000"/>
-              </a:lnSpc>
-              <a:spcBef>
-                <a:spcPts val="500"/>
-              </a:spcBef>
-              <a:buFont typeface="Arial" panose="020B0604020202020204" pitchFamily="34" charset="0"/>
-              <a:buChar char="•"/>
-              <a:defRPr sz="2400" kern="1200">
-                <a:solidFill>
-                  <a:schemeClr val="tx1"/>
-                </a:solidFill>
-                <a:latin typeface="+mn-lt"/>
-                <a:ea typeface="+mn-ea"/>
-                <a:cs typeface="+mn-cs"/>
-              </a:defRPr>
-            </a:lvl2pPr>
-            <a:lvl3pPr marL="1143000" indent="-228600" algn="l" defTabSz="914400" rtl="0" eaLnBrk="1" latinLnBrk="0" hangingPunct="1">
-              <a:lnSpc>
-                <a:spcPct val="90000"/>
-              </a:lnSpc>
-              <a:spcBef>
-                <a:spcPts val="500"/>
-              </a:spcBef>
-              <a:buFont typeface="Arial" panose="020B0604020202020204" pitchFamily="34" charset="0"/>
-              <a:buChar char="•"/>
-              <a:defRPr sz="2000" kern="1200">
-                <a:solidFill>
-                  <a:schemeClr val="tx1"/>
-                </a:solidFill>
-                <a:latin typeface="+mn-lt"/>
-                <a:ea typeface="+mn-ea"/>
-                <a:cs typeface="+mn-cs"/>
-              </a:defRPr>
-            </a:lvl3pPr>
-            <a:lvl4pPr marL="1600200" indent="-228600" algn="l" defTabSz="914400" rtl="0" eaLnBrk="1" latinLnBrk="0" hangingPunct="1">
-              <a:lnSpc>
-                <a:spcPct val="90000"/>
-              </a:lnSpc>
-              <a:spcBef>
-                <a:spcPts val="500"/>
-              </a:spcBef>
-              <a:buFont typeface="Arial" panose="020B0604020202020204" pitchFamily="34" charset="0"/>
-              <a:buChar char="•"/>
-              <a:defRPr sz="1800" kern="1200">
-                <a:solidFill>
-                  <a:schemeClr val="tx1"/>
-                </a:solidFill>
-                <a:latin typeface="+mn-lt"/>
-                <a:ea typeface="+mn-ea"/>
-                <a:cs typeface="+mn-cs"/>
-              </a:defRPr>
-            </a:lvl4pPr>
-            <a:lvl5pPr marL="2057400" indent="-228600" algn="l" defTabSz="914400" rtl="0" eaLnBrk="1" latinLnBrk="0" hangingPunct="1">
-              <a:lnSpc>
-                <a:spcPct val="90000"/>
-              </a:lnSpc>
-              <a:spcBef>
-                <a:spcPts val="500"/>
-              </a:spcBef>
-              <a:buFont typeface="Arial" panose="020B0604020202020204" pitchFamily="34" charset="0"/>
-              <a:buChar char="•"/>
-              <a:defRPr sz="1800" kern="1200">
-                <a:solidFill>
-                  <a:schemeClr val="tx1"/>
-                </a:solidFill>
-                <a:latin typeface="+mn-lt"/>
-                <a:ea typeface="+mn-ea"/>
-                <a:cs typeface="+mn-cs"/>
-              </a:defRPr>
-            </a:lvl5pPr>
-            <a:lvl6pPr marL="2514600" indent="-228600" algn="l" defTabSz="914400" rtl="0" eaLnBrk="1" latinLnBrk="0" hangingPunct="1">
-              <a:lnSpc>
-                <a:spcPct val="90000"/>
-              </a:lnSpc>
-              <a:spcBef>
-                <a:spcPts val="500"/>
-              </a:spcBef>
-              <a:buFont typeface="Arial" panose="020B0604020202020204" pitchFamily="34" charset="0"/>
-              <a:buChar char="•"/>
-              <a:defRPr sz="1800" kern="1200">
-                <a:solidFill>
-                  <a:schemeClr val="tx1"/>
-                </a:solidFill>
-                <a:latin typeface="+mn-lt"/>
-                <a:ea typeface="+mn-ea"/>
-                <a:cs typeface="+mn-cs"/>
-              </a:defRPr>
-            </a:lvl6pPr>
-            <a:lvl7pPr marL="2971800" indent="-228600" algn="l" defTabSz="914400" rtl="0" eaLnBrk="1" latinLnBrk="0" hangingPunct="1">
-              <a:lnSpc>
-                <a:spcPct val="90000"/>
-              </a:lnSpc>
-              <a:spcBef>
-                <a:spcPts val="500"/>
-              </a:spcBef>
-              <a:buFont typeface="Arial" panose="020B0604020202020204" pitchFamily="34" charset="0"/>
-              <a:buChar char="•"/>
-              <a:defRPr sz="1800" kern="1200">
-                <a:solidFill>
-                  <a:schemeClr val="tx1"/>
-                </a:solidFill>
-                <a:latin typeface="+mn-lt"/>
-                <a:ea typeface="+mn-ea"/>
-                <a:cs typeface="+mn-cs"/>
-              </a:defRPr>
-            </a:lvl7pPr>
-            <a:lvl8pPr marL="3429000" indent="-228600" algn="l" defTabSz="914400" rtl="0" eaLnBrk="1" latinLnBrk="0" hangingPunct="1">
-              <a:lnSpc>
-                <a:spcPct val="90000"/>
-              </a:lnSpc>
-              <a:spcBef>
-                <a:spcPts val="500"/>
-              </a:spcBef>
-              <a:buFont typeface="Arial" panose="020B0604020202020204" pitchFamily="34" charset="0"/>
-              <a:buChar char="•"/>
-              <a:defRPr sz="1800" kern="1200">
-                <a:solidFill>
-                  <a:schemeClr val="tx1"/>
-                </a:solidFill>
-                <a:latin typeface="+mn-lt"/>
-                <a:ea typeface="+mn-ea"/>
-                <a:cs typeface="+mn-cs"/>
-              </a:defRPr>
-            </a:lvl8pPr>
-            <a:lvl9pPr marL="3886200" indent="-228600" algn="l" defTabSz="914400" rtl="0" eaLnBrk="1" latinLnBrk="0" hangingPunct="1">
-              <a:lnSpc>
-                <a:spcPct val="90000"/>
-              </a:lnSpc>
-              <a:spcBef>
-                <a:spcPts val="500"/>
-              </a:spcBef>
-              <a:buFont typeface="Arial" panose="020B0604020202020204" pitchFamily="34" charset="0"/>
-              <a:buChar char="•"/>
-              <a:defRPr sz="1800" kern="1200">
-                <a:solidFill>
-                  <a:schemeClr val="tx1"/>
-                </a:solidFill>
-                <a:latin typeface="+mn-lt"/>
-                <a:ea typeface="+mn-ea"/>
-                <a:cs typeface="+mn-cs"/>
-              </a:defRPr>
-            </a:lvl9pPr>
-          </a:lstStyle>
-          <a:p>
-            <a:r>
-              <a:rPr lang="en-US" dirty="0">
-                <a:ea typeface="Source Sans Pro"/>
-              </a:rPr>
-              <a:t>H</a:t>
-            </a:r>
-          </a:p>
-        </p:txBody>
-      </p:sp>
-      <p:sp>
-        <p:nvSpPr>
-          <p:cNvPr id="4" name="Text Placeholder 16">
-            <a:extLst>
-              <a:ext uri="{FF2B5EF4-FFF2-40B4-BE49-F238E27FC236}">
-                <a16:creationId xmlns:a16="http://schemas.microsoft.com/office/drawing/2014/main" id="{6ABCAC18-16F8-16E2-D890-8804C5B4F022}"/>
-              </a:ext>
-            </a:extLst>
-          </p:cNvPr>
-          <p:cNvSpPr txBox="1">
-            <a:spLocks/>
-          </p:cNvSpPr>
-          <p:nvPr/>
-        </p:nvSpPr>
-        <p:spPr>
-          <a:xfrm>
-            <a:off x="1322364" y="2084304"/>
-            <a:ext cx="1253665" cy="1681163"/>
-          </a:xfrm>
-          <a:prstGeom prst="rect">
-            <a:avLst/>
-          </a:prstGeom>
-        </p:spPr>
-        <p:txBody>
-          <a:bodyPr vert="horz" lIns="91440" tIns="45720" rIns="91440" bIns="45720" rtlCol="0" anchor="t">
-            <a:noAutofit/>
-          </a:bodyPr>
-          <a:lstStyle>
-            <a:lvl1pPr marL="0" indent="0" algn="l" defTabSz="914400" rtl="0" eaLnBrk="1" latinLnBrk="0" hangingPunct="1">
-              <a:lnSpc>
-                <a:spcPct val="90000"/>
-              </a:lnSpc>
-              <a:spcBef>
-                <a:spcPts val="1000"/>
-              </a:spcBef>
-              <a:buFont typeface="Arial" panose="020B0604020202020204" pitchFamily="34" charset="0"/>
-              <a:buNone/>
-              <a:defRPr sz="15500" b="1" kern="1200">
-                <a:solidFill>
-                  <a:schemeClr val="tx1"/>
-                </a:solidFill>
-                <a:latin typeface="+mn-lt"/>
-                <a:ea typeface="+mn-ea"/>
-                <a:cs typeface="+mn-cs"/>
-              </a:defRPr>
-            </a:lvl1pPr>
-            <a:lvl2pPr marL="685800" indent="-228600" algn="l" defTabSz="914400" rtl="0" eaLnBrk="1" latinLnBrk="0" hangingPunct="1">
-              <a:lnSpc>
-                <a:spcPct val="90000"/>
-              </a:lnSpc>
-              <a:spcBef>
-                <a:spcPts val="500"/>
-              </a:spcBef>
-              <a:buFont typeface="Arial" panose="020B0604020202020204" pitchFamily="34" charset="0"/>
-              <a:buChar char="•"/>
-              <a:defRPr sz="2400" kern="1200">
-                <a:solidFill>
-                  <a:schemeClr val="tx1"/>
-                </a:solidFill>
-                <a:latin typeface="+mn-lt"/>
-                <a:ea typeface="+mn-ea"/>
-                <a:cs typeface="+mn-cs"/>
-              </a:defRPr>
-            </a:lvl2pPr>
-            <a:lvl3pPr marL="1143000" indent="-228600" algn="l" defTabSz="914400" rtl="0" eaLnBrk="1" latinLnBrk="0" hangingPunct="1">
-              <a:lnSpc>
-                <a:spcPct val="90000"/>
-              </a:lnSpc>
-              <a:spcBef>
-                <a:spcPts val="500"/>
-              </a:spcBef>
-              <a:buFont typeface="Arial" panose="020B0604020202020204" pitchFamily="34" charset="0"/>
-              <a:buChar char="•"/>
-              <a:defRPr sz="2000" kern="1200">
-                <a:solidFill>
-                  <a:schemeClr val="tx1"/>
-                </a:solidFill>
-                <a:latin typeface="+mn-lt"/>
-                <a:ea typeface="+mn-ea"/>
-                <a:cs typeface="+mn-cs"/>
-              </a:defRPr>
-            </a:lvl3pPr>
-            <a:lvl4pPr marL="1600200" indent="-228600" algn="l" defTabSz="914400" rtl="0" eaLnBrk="1" latinLnBrk="0" hangingPunct="1">
-              <a:lnSpc>
-                <a:spcPct val="90000"/>
-              </a:lnSpc>
-              <a:spcBef>
-                <a:spcPts val="500"/>
-              </a:spcBef>
-              <a:buFont typeface="Arial" panose="020B0604020202020204" pitchFamily="34" charset="0"/>
-              <a:buChar char="•"/>
-              <a:defRPr sz="1800" kern="1200">
-                <a:solidFill>
-                  <a:schemeClr val="tx1"/>
-                </a:solidFill>
-                <a:latin typeface="+mn-lt"/>
-                <a:ea typeface="+mn-ea"/>
-                <a:cs typeface="+mn-cs"/>
-              </a:defRPr>
-            </a:lvl4pPr>
-            <a:lvl5pPr marL="2057400" indent="-228600" algn="l" defTabSz="914400" rtl="0" eaLnBrk="1" latinLnBrk="0" hangingPunct="1">
-              <a:lnSpc>
-                <a:spcPct val="90000"/>
-              </a:lnSpc>
-              <a:spcBef>
-                <a:spcPts val="500"/>
-              </a:spcBef>
-              <a:buFont typeface="Arial" panose="020B0604020202020204" pitchFamily="34" charset="0"/>
-              <a:buChar char="•"/>
-              <a:defRPr sz="1800" kern="1200">
-                <a:solidFill>
-                  <a:schemeClr val="tx1"/>
-                </a:solidFill>
-                <a:latin typeface="+mn-lt"/>
-                <a:ea typeface="+mn-ea"/>
-                <a:cs typeface="+mn-cs"/>
-              </a:defRPr>
-            </a:lvl5pPr>
-            <a:lvl6pPr marL="2514600" indent="-228600" algn="l" defTabSz="914400" rtl="0" eaLnBrk="1" latinLnBrk="0" hangingPunct="1">
-              <a:lnSpc>
-                <a:spcPct val="90000"/>
-              </a:lnSpc>
-              <a:spcBef>
-                <a:spcPts val="500"/>
-              </a:spcBef>
-              <a:buFont typeface="Arial" panose="020B0604020202020204" pitchFamily="34" charset="0"/>
-              <a:buChar char="•"/>
-              <a:defRPr sz="1800" kern="1200">
-                <a:solidFill>
-                  <a:schemeClr val="tx1"/>
-                </a:solidFill>
-                <a:latin typeface="+mn-lt"/>
-                <a:ea typeface="+mn-ea"/>
-                <a:cs typeface="+mn-cs"/>
-              </a:defRPr>
-            </a:lvl6pPr>
-            <a:lvl7pPr marL="2971800" indent="-228600" algn="l" defTabSz="914400" rtl="0" eaLnBrk="1" latinLnBrk="0" hangingPunct="1">
-              <a:lnSpc>
-                <a:spcPct val="90000"/>
-              </a:lnSpc>
-              <a:spcBef>
-                <a:spcPts val="500"/>
-              </a:spcBef>
-              <a:buFont typeface="Arial" panose="020B0604020202020204" pitchFamily="34" charset="0"/>
-              <a:buChar char="•"/>
-              <a:defRPr sz="1800" kern="1200">
-                <a:solidFill>
-                  <a:schemeClr val="tx1"/>
-                </a:solidFill>
-                <a:latin typeface="+mn-lt"/>
-                <a:ea typeface="+mn-ea"/>
-                <a:cs typeface="+mn-cs"/>
-              </a:defRPr>
-            </a:lvl7pPr>
-            <a:lvl8pPr marL="3429000" indent="-228600" algn="l" defTabSz="914400" rtl="0" eaLnBrk="1" latinLnBrk="0" hangingPunct="1">
-              <a:lnSpc>
-                <a:spcPct val="90000"/>
-              </a:lnSpc>
-              <a:spcBef>
-                <a:spcPts val="500"/>
-              </a:spcBef>
-              <a:buFont typeface="Arial" panose="020B0604020202020204" pitchFamily="34" charset="0"/>
-              <a:buChar char="•"/>
-              <a:defRPr sz="1800" kern="1200">
-                <a:solidFill>
-                  <a:schemeClr val="tx1"/>
-                </a:solidFill>
-                <a:latin typeface="+mn-lt"/>
-                <a:ea typeface="+mn-ea"/>
-                <a:cs typeface="+mn-cs"/>
-              </a:defRPr>
-            </a:lvl8pPr>
-            <a:lvl9pPr marL="3886200" indent="-228600" algn="l" defTabSz="914400" rtl="0" eaLnBrk="1" latinLnBrk="0" hangingPunct="1">
-              <a:lnSpc>
-                <a:spcPct val="90000"/>
-              </a:lnSpc>
-              <a:spcBef>
-                <a:spcPts val="500"/>
-              </a:spcBef>
-              <a:buFont typeface="Arial" panose="020B0604020202020204" pitchFamily="34" charset="0"/>
-              <a:buChar char="•"/>
-              <a:defRPr sz="1800" kern="1200">
-                <a:solidFill>
-                  <a:schemeClr val="tx1"/>
-                </a:solidFill>
-                <a:latin typeface="+mn-lt"/>
-                <a:ea typeface="+mn-ea"/>
-                <a:cs typeface="+mn-cs"/>
-              </a:defRPr>
-            </a:lvl9pPr>
-          </a:lstStyle>
-          <a:p>
-            <a:r>
-              <a:rPr lang="en-US" dirty="0">
-                <a:ea typeface="Source Sans Pro"/>
-              </a:rPr>
-              <a:t>F</a:t>
-            </a:r>
-            <a:endParaRPr lang="de-DE" dirty="0"/>
-          </a:p>
-        </p:txBody>
-      </p:sp>
-      <p:sp>
-        <p:nvSpPr>
-          <p:cNvPr id="5" name="Text Placeholder 16">
-            <a:extLst>
-              <a:ext uri="{FF2B5EF4-FFF2-40B4-BE49-F238E27FC236}">
-                <a16:creationId xmlns:a16="http://schemas.microsoft.com/office/drawing/2014/main" id="{2B3490F3-310B-75F3-246F-3908667F406A}"/>
-              </a:ext>
-            </a:extLst>
-          </p:cNvPr>
-          <p:cNvSpPr txBox="1">
-            <a:spLocks/>
-          </p:cNvSpPr>
-          <p:nvPr/>
-        </p:nvSpPr>
-        <p:spPr>
-          <a:xfrm>
-            <a:off x="2740900" y="2409417"/>
-            <a:ext cx="1253665" cy="1681163"/>
-          </a:xfrm>
-          <a:prstGeom prst="rect">
-            <a:avLst/>
-          </a:prstGeom>
-        </p:spPr>
-        <p:txBody>
-          <a:bodyPr vert="horz" lIns="91440" tIns="45720" rIns="91440" bIns="45720" rtlCol="0" anchor="t">
-            <a:noAutofit/>
-          </a:bodyPr>
-          <a:lstStyle>
-            <a:lvl1pPr marL="0" indent="0" algn="l" defTabSz="914400" rtl="0" eaLnBrk="1" latinLnBrk="0" hangingPunct="1">
-              <a:lnSpc>
-                <a:spcPct val="90000"/>
-              </a:lnSpc>
-              <a:spcBef>
-                <a:spcPts val="1000"/>
-              </a:spcBef>
-              <a:buFont typeface="Arial" panose="020B0604020202020204" pitchFamily="34" charset="0"/>
-              <a:buNone/>
-              <a:defRPr sz="15500" b="1" kern="1200">
-                <a:solidFill>
-                  <a:schemeClr val="tx1"/>
-                </a:solidFill>
-                <a:latin typeface="+mn-lt"/>
-                <a:ea typeface="+mn-ea"/>
-                <a:cs typeface="+mn-cs"/>
-              </a:defRPr>
-            </a:lvl1pPr>
-            <a:lvl2pPr marL="685800" indent="-228600" algn="l" defTabSz="914400" rtl="0" eaLnBrk="1" latinLnBrk="0" hangingPunct="1">
-              <a:lnSpc>
-                <a:spcPct val="90000"/>
-              </a:lnSpc>
-              <a:spcBef>
-                <a:spcPts val="500"/>
-              </a:spcBef>
-              <a:buFont typeface="Arial" panose="020B0604020202020204" pitchFamily="34" charset="0"/>
-              <a:buChar char="•"/>
-              <a:defRPr sz="2400" kern="1200">
-                <a:solidFill>
-                  <a:schemeClr val="tx1"/>
-                </a:solidFill>
-                <a:latin typeface="+mn-lt"/>
-                <a:ea typeface="+mn-ea"/>
-                <a:cs typeface="+mn-cs"/>
-              </a:defRPr>
-            </a:lvl2pPr>
-            <a:lvl3pPr marL="1143000" indent="-228600" algn="l" defTabSz="914400" rtl="0" eaLnBrk="1" latinLnBrk="0" hangingPunct="1">
-              <a:lnSpc>
-                <a:spcPct val="90000"/>
-              </a:lnSpc>
-              <a:spcBef>
-                <a:spcPts val="500"/>
-              </a:spcBef>
-              <a:buFont typeface="Arial" panose="020B0604020202020204" pitchFamily="34" charset="0"/>
-              <a:buChar char="•"/>
-              <a:defRPr sz="2000" kern="1200">
-                <a:solidFill>
-                  <a:schemeClr val="tx1"/>
-                </a:solidFill>
-                <a:latin typeface="+mn-lt"/>
-                <a:ea typeface="+mn-ea"/>
-                <a:cs typeface="+mn-cs"/>
-              </a:defRPr>
-            </a:lvl3pPr>
-            <a:lvl4pPr marL="1600200" indent="-228600" algn="l" defTabSz="914400" rtl="0" eaLnBrk="1" latinLnBrk="0" hangingPunct="1">
-              <a:lnSpc>
-                <a:spcPct val="90000"/>
-              </a:lnSpc>
-              <a:spcBef>
-                <a:spcPts val="500"/>
-              </a:spcBef>
-              <a:buFont typeface="Arial" panose="020B0604020202020204" pitchFamily="34" charset="0"/>
-              <a:buChar char="•"/>
-              <a:defRPr sz="1800" kern="1200">
-                <a:solidFill>
-                  <a:schemeClr val="tx1"/>
-                </a:solidFill>
-                <a:latin typeface="+mn-lt"/>
-                <a:ea typeface="+mn-ea"/>
-                <a:cs typeface="+mn-cs"/>
-              </a:defRPr>
-            </a:lvl4pPr>
-            <a:lvl5pPr marL="2057400" indent="-228600" algn="l" defTabSz="914400" rtl="0" eaLnBrk="1" latinLnBrk="0" hangingPunct="1">
-              <a:lnSpc>
-                <a:spcPct val="90000"/>
-              </a:lnSpc>
-              <a:spcBef>
-                <a:spcPts val="500"/>
-              </a:spcBef>
-              <a:buFont typeface="Arial" panose="020B0604020202020204" pitchFamily="34" charset="0"/>
-              <a:buChar char="•"/>
-              <a:defRPr sz="1800" kern="1200">
-                <a:solidFill>
-                  <a:schemeClr val="tx1"/>
-                </a:solidFill>
-                <a:latin typeface="+mn-lt"/>
-                <a:ea typeface="+mn-ea"/>
-                <a:cs typeface="+mn-cs"/>
-              </a:defRPr>
-            </a:lvl5pPr>
-            <a:lvl6pPr marL="2514600" indent="-228600" algn="l" defTabSz="914400" rtl="0" eaLnBrk="1" latinLnBrk="0" hangingPunct="1">
-              <a:lnSpc>
-                <a:spcPct val="90000"/>
-              </a:lnSpc>
-              <a:spcBef>
-                <a:spcPts val="500"/>
-              </a:spcBef>
-              <a:buFont typeface="Arial" panose="020B0604020202020204" pitchFamily="34" charset="0"/>
-              <a:buChar char="•"/>
-              <a:defRPr sz="1800" kern="1200">
-                <a:solidFill>
-                  <a:schemeClr val="tx1"/>
-                </a:solidFill>
-                <a:latin typeface="+mn-lt"/>
-                <a:ea typeface="+mn-ea"/>
-                <a:cs typeface="+mn-cs"/>
-              </a:defRPr>
-            </a:lvl6pPr>
-            <a:lvl7pPr marL="2971800" indent="-228600" algn="l" defTabSz="914400" rtl="0" eaLnBrk="1" latinLnBrk="0" hangingPunct="1">
-              <a:lnSpc>
-                <a:spcPct val="90000"/>
-              </a:lnSpc>
-              <a:spcBef>
-                <a:spcPts val="500"/>
-              </a:spcBef>
-              <a:buFont typeface="Arial" panose="020B0604020202020204" pitchFamily="34" charset="0"/>
-              <a:buChar char="•"/>
-              <a:defRPr sz="1800" kern="1200">
-                <a:solidFill>
-                  <a:schemeClr val="tx1"/>
-                </a:solidFill>
-                <a:latin typeface="+mn-lt"/>
-                <a:ea typeface="+mn-ea"/>
-                <a:cs typeface="+mn-cs"/>
-              </a:defRPr>
-            </a:lvl7pPr>
-            <a:lvl8pPr marL="3429000" indent="-228600" algn="l" defTabSz="914400" rtl="0" eaLnBrk="1" latinLnBrk="0" hangingPunct="1">
-              <a:lnSpc>
-                <a:spcPct val="90000"/>
-              </a:lnSpc>
-              <a:spcBef>
-                <a:spcPts val="500"/>
-              </a:spcBef>
-              <a:buFont typeface="Arial" panose="020B0604020202020204" pitchFamily="34" charset="0"/>
-              <a:buChar char="•"/>
-              <a:defRPr sz="1800" kern="1200">
-                <a:solidFill>
-                  <a:schemeClr val="tx1"/>
-                </a:solidFill>
-                <a:latin typeface="+mn-lt"/>
-                <a:ea typeface="+mn-ea"/>
-                <a:cs typeface="+mn-cs"/>
-              </a:defRPr>
-            </a:lvl8pPr>
-            <a:lvl9pPr marL="3886200" indent="-228600" algn="l" defTabSz="914400" rtl="0" eaLnBrk="1" latinLnBrk="0" hangingPunct="1">
-              <a:lnSpc>
-                <a:spcPct val="90000"/>
-              </a:lnSpc>
-              <a:spcBef>
-                <a:spcPts val="500"/>
-              </a:spcBef>
-              <a:buFont typeface="Arial" panose="020B0604020202020204" pitchFamily="34" charset="0"/>
-              <a:buChar char="•"/>
-              <a:defRPr sz="1800" kern="1200">
-                <a:solidFill>
-                  <a:schemeClr val="tx1"/>
-                </a:solidFill>
-                <a:latin typeface="+mn-lt"/>
-                <a:ea typeface="+mn-ea"/>
-                <a:cs typeface="+mn-cs"/>
-              </a:defRPr>
-            </a:lvl9pPr>
-          </a:lstStyle>
-          <a:p>
-            <a:r>
-              <a:rPr lang="en-US" dirty="0">
-                <a:ea typeface="Source Sans Pro"/>
-              </a:rPr>
-              <a:t>N</a:t>
-            </a:r>
-            <a:endParaRPr lang="de-DE" dirty="0"/>
-          </a:p>
-        </p:txBody>
-      </p:sp>
-      <p:sp>
-        <p:nvSpPr>
-          <p:cNvPr id="6" name="Text Placeholder 16">
-            <a:extLst>
-              <a:ext uri="{FF2B5EF4-FFF2-40B4-BE49-F238E27FC236}">
-                <a16:creationId xmlns:a16="http://schemas.microsoft.com/office/drawing/2014/main" id="{4E59CAC9-E50E-D9D5-BC12-1254C3F97007}"/>
-              </a:ext>
-            </a:extLst>
-          </p:cNvPr>
-          <p:cNvSpPr txBox="1">
-            <a:spLocks/>
-          </p:cNvSpPr>
-          <p:nvPr/>
-        </p:nvSpPr>
-        <p:spPr>
-          <a:xfrm>
-            <a:off x="1895803" y="2779349"/>
-            <a:ext cx="1253665" cy="1681163"/>
-          </a:xfrm>
-          <a:prstGeom prst="rect">
-            <a:avLst/>
-          </a:prstGeom>
-        </p:spPr>
-        <p:txBody>
-          <a:bodyPr vert="horz" lIns="91440" tIns="45720" rIns="91440" bIns="45720" rtlCol="0" anchor="t">
-            <a:noAutofit/>
-          </a:bodyPr>
-          <a:lstStyle>
-            <a:lvl1pPr marL="0" indent="0" algn="l" defTabSz="914400" rtl="0" eaLnBrk="1" latinLnBrk="0" hangingPunct="1">
-              <a:lnSpc>
-                <a:spcPct val="90000"/>
-              </a:lnSpc>
-              <a:spcBef>
-                <a:spcPts val="1000"/>
-              </a:spcBef>
-              <a:buFont typeface="Arial" panose="020B0604020202020204" pitchFamily="34" charset="0"/>
-              <a:buNone/>
-              <a:defRPr sz="15500" b="1" kern="1200">
-                <a:solidFill>
-                  <a:schemeClr val="tx1"/>
-                </a:solidFill>
-                <a:latin typeface="+mn-lt"/>
-                <a:ea typeface="+mn-ea"/>
-                <a:cs typeface="+mn-cs"/>
-              </a:defRPr>
-            </a:lvl1pPr>
-            <a:lvl2pPr marL="685800" indent="-228600" algn="l" defTabSz="914400" rtl="0" eaLnBrk="1" latinLnBrk="0" hangingPunct="1">
-              <a:lnSpc>
-                <a:spcPct val="90000"/>
-              </a:lnSpc>
-              <a:spcBef>
-                <a:spcPts val="500"/>
-              </a:spcBef>
-              <a:buFont typeface="Arial" panose="020B0604020202020204" pitchFamily="34" charset="0"/>
-              <a:buChar char="•"/>
-              <a:defRPr sz="2400" kern="1200">
-                <a:solidFill>
-                  <a:schemeClr val="tx1"/>
-                </a:solidFill>
-                <a:latin typeface="+mn-lt"/>
-                <a:ea typeface="+mn-ea"/>
-                <a:cs typeface="+mn-cs"/>
-              </a:defRPr>
-            </a:lvl2pPr>
-            <a:lvl3pPr marL="1143000" indent="-228600" algn="l" defTabSz="914400" rtl="0" eaLnBrk="1" latinLnBrk="0" hangingPunct="1">
-              <a:lnSpc>
-                <a:spcPct val="90000"/>
-              </a:lnSpc>
-              <a:spcBef>
-                <a:spcPts val="500"/>
-              </a:spcBef>
-              <a:buFont typeface="Arial" panose="020B0604020202020204" pitchFamily="34" charset="0"/>
-              <a:buChar char="•"/>
-              <a:defRPr sz="2000" kern="1200">
-                <a:solidFill>
-                  <a:schemeClr val="tx1"/>
-                </a:solidFill>
-                <a:latin typeface="+mn-lt"/>
-                <a:ea typeface="+mn-ea"/>
-                <a:cs typeface="+mn-cs"/>
-              </a:defRPr>
-            </a:lvl3pPr>
-            <a:lvl4pPr marL="1600200" indent="-228600" algn="l" defTabSz="914400" rtl="0" eaLnBrk="1" latinLnBrk="0" hangingPunct="1">
-              <a:lnSpc>
-                <a:spcPct val="90000"/>
-              </a:lnSpc>
-              <a:spcBef>
-                <a:spcPts val="500"/>
-              </a:spcBef>
-              <a:buFont typeface="Arial" panose="020B0604020202020204" pitchFamily="34" charset="0"/>
-              <a:buChar char="•"/>
-              <a:defRPr sz="1800" kern="1200">
-                <a:solidFill>
-                  <a:schemeClr val="tx1"/>
-                </a:solidFill>
-                <a:latin typeface="+mn-lt"/>
-                <a:ea typeface="+mn-ea"/>
-                <a:cs typeface="+mn-cs"/>
-              </a:defRPr>
-            </a:lvl4pPr>
-            <a:lvl5pPr marL="2057400" indent="-228600" algn="l" defTabSz="914400" rtl="0" eaLnBrk="1" latinLnBrk="0" hangingPunct="1">
-              <a:lnSpc>
-                <a:spcPct val="90000"/>
-              </a:lnSpc>
-              <a:spcBef>
-                <a:spcPts val="500"/>
-              </a:spcBef>
-              <a:buFont typeface="Arial" panose="020B0604020202020204" pitchFamily="34" charset="0"/>
-              <a:buChar char="•"/>
-              <a:defRPr sz="1800" kern="1200">
-                <a:solidFill>
-                  <a:schemeClr val="tx1"/>
-                </a:solidFill>
-                <a:latin typeface="+mn-lt"/>
-                <a:ea typeface="+mn-ea"/>
-                <a:cs typeface="+mn-cs"/>
-              </a:defRPr>
-            </a:lvl5pPr>
-            <a:lvl6pPr marL="2514600" indent="-228600" algn="l" defTabSz="914400" rtl="0" eaLnBrk="1" latinLnBrk="0" hangingPunct="1">
-              <a:lnSpc>
-                <a:spcPct val="90000"/>
-              </a:lnSpc>
-              <a:spcBef>
-                <a:spcPts val="500"/>
-              </a:spcBef>
-              <a:buFont typeface="Arial" panose="020B0604020202020204" pitchFamily="34" charset="0"/>
-              <a:buChar char="•"/>
-              <a:defRPr sz="1800" kern="1200">
-                <a:solidFill>
-                  <a:schemeClr val="tx1"/>
-                </a:solidFill>
-                <a:latin typeface="+mn-lt"/>
-                <a:ea typeface="+mn-ea"/>
-                <a:cs typeface="+mn-cs"/>
-              </a:defRPr>
-            </a:lvl6pPr>
-            <a:lvl7pPr marL="2971800" indent="-228600" algn="l" defTabSz="914400" rtl="0" eaLnBrk="1" latinLnBrk="0" hangingPunct="1">
-              <a:lnSpc>
-                <a:spcPct val="90000"/>
-              </a:lnSpc>
-              <a:spcBef>
-                <a:spcPts val="500"/>
-              </a:spcBef>
-              <a:buFont typeface="Arial" panose="020B0604020202020204" pitchFamily="34" charset="0"/>
-              <a:buChar char="•"/>
-              <a:defRPr sz="1800" kern="1200">
-                <a:solidFill>
-                  <a:schemeClr val="tx1"/>
-                </a:solidFill>
-                <a:latin typeface="+mn-lt"/>
-                <a:ea typeface="+mn-ea"/>
-                <a:cs typeface="+mn-cs"/>
-              </a:defRPr>
-            </a:lvl7pPr>
-            <a:lvl8pPr marL="3429000" indent="-228600" algn="l" defTabSz="914400" rtl="0" eaLnBrk="1" latinLnBrk="0" hangingPunct="1">
-              <a:lnSpc>
-                <a:spcPct val="90000"/>
-              </a:lnSpc>
-              <a:spcBef>
-                <a:spcPts val="500"/>
-              </a:spcBef>
-              <a:buFont typeface="Arial" panose="020B0604020202020204" pitchFamily="34" charset="0"/>
-              <a:buChar char="•"/>
-              <a:defRPr sz="1800" kern="1200">
-                <a:solidFill>
-                  <a:schemeClr val="tx1"/>
-                </a:solidFill>
-                <a:latin typeface="+mn-lt"/>
-                <a:ea typeface="+mn-ea"/>
-                <a:cs typeface="+mn-cs"/>
-              </a:defRPr>
-            </a:lvl8pPr>
-            <a:lvl9pPr marL="3886200" indent="-228600" algn="l" defTabSz="914400" rtl="0" eaLnBrk="1" latinLnBrk="0" hangingPunct="1">
-              <a:lnSpc>
-                <a:spcPct val="90000"/>
-              </a:lnSpc>
-              <a:spcBef>
-                <a:spcPts val="500"/>
-              </a:spcBef>
-              <a:buFont typeface="Arial" panose="020B0604020202020204" pitchFamily="34" charset="0"/>
-              <a:buChar char="•"/>
-              <a:defRPr sz="1800" kern="1200">
-                <a:solidFill>
-                  <a:schemeClr val="tx1"/>
-                </a:solidFill>
-                <a:latin typeface="+mn-lt"/>
-                <a:ea typeface="+mn-ea"/>
-                <a:cs typeface="+mn-cs"/>
-              </a:defRPr>
-            </a:lvl9pPr>
-          </a:lstStyle>
-          <a:p>
-            <a:r>
-              <a:rPr lang="en-US" dirty="0">
-                <a:ea typeface="Source Sans Pro"/>
-              </a:rPr>
-              <a:t>E</a:t>
-            </a:r>
-            <a:endParaRPr lang="de-DE" dirty="0"/>
-          </a:p>
-        </p:txBody>
-      </p:sp>
-      <p:cxnSp>
-        <p:nvCxnSpPr>
-          <p:cNvPr id="10" name="Straight Connector 9">
-            <a:extLst>
-              <a:ext uri="{FF2B5EF4-FFF2-40B4-BE49-F238E27FC236}">
-                <a16:creationId xmlns:a16="http://schemas.microsoft.com/office/drawing/2014/main" id="{06745735-98C9-DB82-EAE0-E3982C3ECFF9}"/>
-              </a:ext>
-              <a:ext uri="{C183D7F6-B498-43B3-948B-1728B52AA6E4}">
-                <adec:decorative xmlns:adec="http://schemas.microsoft.com/office/drawing/2017/decorative" val="1"/>
-              </a:ext>
-            </a:extLst>
-          </p:cNvPr>
-          <p:cNvCxnSpPr>
-            <a:cxnSpLocks/>
-          </p:cNvCxnSpPr>
-          <p:nvPr/>
-        </p:nvCxnSpPr>
-        <p:spPr>
-          <a:xfrm flipV="1">
-            <a:off x="677714" y="824568"/>
-            <a:ext cx="0" cy="5339213"/>
-          </a:xfrm>
-          <a:prstGeom prst="line">
-            <a:avLst/>
-          </a:prstGeom>
-          <a:ln w="19050">
-            <a:solidFill>
-              <a:schemeClr val="accent1"/>
-            </a:solidFill>
-          </a:ln>
-        </p:spPr>
-        <p:style>
-          <a:lnRef idx="1">
-            <a:schemeClr val="accent1"/>
-          </a:lnRef>
-          <a:fillRef idx="0">
-            <a:schemeClr val="accent1"/>
-          </a:fillRef>
-          <a:effectRef idx="0">
-            <a:schemeClr val="accent1"/>
-          </a:effectRef>
-          <a:fontRef idx="minor">
-            <a:schemeClr val="tx1"/>
-          </a:fontRef>
-        </p:style>
-      </p:cxnSp>
-    </p:spTree>
-    <p:extLst>
-      <p:ext uri="{BB962C8B-B14F-4D97-AF65-F5344CB8AC3E}">
-        <p14:creationId xmlns:p14="http://schemas.microsoft.com/office/powerpoint/2010/main" val="3747000269"/>
-      </p:ext>
-    </p:extLst>
-  </p:cSld>
-  <p:clrMapOvr>
-    <a:masterClrMapping/>
-  </p:clrMapOvr>
-</p:sld>
-</file>
-
-<file path=ppt/slides/slide11.xml><?xml version="1.0" encoding="utf-8"?>
-<p:sld xmlns:a="http://schemas.openxmlformats.org/drawingml/2006/main" xmlns:r="http://schemas.openxmlformats.org/officeDocument/2006/relationships" xmlns:p="http://schemas.openxmlformats.org/presentationml/2006/main">
-  <p:cSld>
-    <p:spTree>
-      <p:nvGrpSpPr>
-        <p:cNvPr id="1" name="">
-          <a:extLst>
-            <a:ext uri="{FF2B5EF4-FFF2-40B4-BE49-F238E27FC236}">
               <a16:creationId xmlns:a16="http://schemas.microsoft.com/office/drawing/2014/main" id="{A0BABD68-9F23-198D-8F68-C77E6EB17EB0}"/>
             </a:ext>
           </a:extLst>
@@ -18869,7 +17656,7 @@
           <a:p>
             <a:r>
               <a:rPr lang="de-DE" noProof="1"/>
-              <a:t>Erklärung der Engine-Evaluierung in menschlich verständlicher Sprache</a:t>
+              <a:t>Ziel: Erklärung der Engine-Evaluierung in menschlich verständlicher Sprache</a:t>
             </a:r>
             <a:endParaRPr lang="en-ZA" noProof="1"/>
           </a:p>
@@ -19036,428 +17823,188 @@
   <p:clrMapOvr>
     <a:masterClrMapping/>
   </p:clrMapOvr>
+  <p:timing>
+    <p:tnLst>
+      <p:par>
+        <p:cTn id="1" dur="indefinite" restart="never" nodeType="tmRoot">
+          <p:childTnLst>
+            <p:seq concurrent="1" nextAc="seek">
+              <p:cTn id="2" dur="indefinite" nodeType="mainSeq">
+                <p:childTnLst>
+                  <p:par>
+                    <p:cTn id="3" fill="hold">
+                      <p:stCondLst>
+                        <p:cond delay="indefinite"/>
+                      </p:stCondLst>
+                      <p:childTnLst>
+                        <p:par>
+                          <p:cTn id="4" fill="hold">
+                            <p:stCondLst>
+                              <p:cond delay="0"/>
+                            </p:stCondLst>
+                            <p:childTnLst>
+                              <p:par>
+                                <p:cTn id="5" presetID="1" presetClass="entr" presetSubtype="0" fill="hold" grpId="0" nodeType="clickEffect">
+                                  <p:stCondLst>
+                                    <p:cond delay="0"/>
+                                  </p:stCondLst>
+                                  <p:childTnLst>
+                                    <p:set>
+                                      <p:cBhvr>
+                                        <p:cTn id="6" dur="1" fill="hold">
+                                          <p:stCondLst>
+                                            <p:cond delay="0"/>
+                                          </p:stCondLst>
+                                        </p:cTn>
+                                        <p:tgtEl>
+                                          <p:spTgt spid="51"/>
+                                        </p:tgtEl>
+                                        <p:attrNameLst>
+                                          <p:attrName>style.visibility</p:attrName>
+                                        </p:attrNameLst>
+                                      </p:cBhvr>
+                                      <p:to>
+                                        <p:strVal val="visible"/>
+                                      </p:to>
+                                    </p:set>
+                                  </p:childTnLst>
+                                </p:cTn>
+                              </p:par>
+                              <p:par>
+                                <p:cTn id="7" presetID="1" presetClass="entr" presetSubtype="0" fill="hold" nodeType="withEffect">
+                                  <p:stCondLst>
+                                    <p:cond delay="0"/>
+                                  </p:stCondLst>
+                                  <p:childTnLst>
+                                    <p:set>
+                                      <p:cBhvr>
+                                        <p:cTn id="8" dur="1" fill="hold">
+                                          <p:stCondLst>
+                                            <p:cond delay="0"/>
+                                          </p:stCondLst>
+                                        </p:cTn>
+                                        <p:tgtEl>
+                                          <p:spTgt spid="52"/>
+                                        </p:tgtEl>
+                                        <p:attrNameLst>
+                                          <p:attrName>style.visibility</p:attrName>
+                                        </p:attrNameLst>
+                                      </p:cBhvr>
+                                      <p:to>
+                                        <p:strVal val="visible"/>
+                                      </p:to>
+                                    </p:set>
+                                  </p:childTnLst>
+                                </p:cTn>
+                              </p:par>
+                              <p:par>
+                                <p:cTn id="9" presetID="1" presetClass="entr" presetSubtype="0" fill="hold" nodeType="withEffect">
+                                  <p:stCondLst>
+                                    <p:cond delay="0"/>
+                                  </p:stCondLst>
+                                  <p:childTnLst>
+                                    <p:set>
+                                      <p:cBhvr>
+                                        <p:cTn id="10" dur="1" fill="hold">
+                                          <p:stCondLst>
+                                            <p:cond delay="0"/>
+                                          </p:stCondLst>
+                                        </p:cTn>
+                                        <p:tgtEl>
+                                          <p:spTgt spid="55"/>
+                                        </p:tgtEl>
+                                        <p:attrNameLst>
+                                          <p:attrName>style.visibility</p:attrName>
+                                        </p:attrNameLst>
+                                      </p:cBhvr>
+                                      <p:to>
+                                        <p:strVal val="visible"/>
+                                      </p:to>
+                                    </p:set>
+                                  </p:childTnLst>
+                                </p:cTn>
+                              </p:par>
+                            </p:childTnLst>
+                          </p:cTn>
+                        </p:par>
+                      </p:childTnLst>
+                    </p:cTn>
+                  </p:par>
+                  <p:par>
+                    <p:cTn id="11" fill="hold">
+                      <p:stCondLst>
+                        <p:cond delay="indefinite"/>
+                      </p:stCondLst>
+                      <p:childTnLst>
+                        <p:par>
+                          <p:cTn id="12" fill="hold">
+                            <p:stCondLst>
+                              <p:cond delay="0"/>
+                            </p:stCondLst>
+                            <p:childTnLst>
+                              <p:par>
+                                <p:cTn id="13" presetID="1" presetClass="entr" presetSubtype="0" fill="hold" grpId="0" nodeType="clickEffect">
+                                  <p:stCondLst>
+                                    <p:cond delay="0"/>
+                                  </p:stCondLst>
+                                  <p:childTnLst>
+                                    <p:set>
+                                      <p:cBhvr>
+                                        <p:cTn id="14" dur="1" fill="hold">
+                                          <p:stCondLst>
+                                            <p:cond delay="0"/>
+                                          </p:stCondLst>
+                                        </p:cTn>
+                                        <p:tgtEl>
+                                          <p:spTgt spid="42"/>
+                                        </p:tgtEl>
+                                        <p:attrNameLst>
+                                          <p:attrName>style.visibility</p:attrName>
+                                        </p:attrNameLst>
+                                      </p:cBhvr>
+                                      <p:to>
+                                        <p:strVal val="visible"/>
+                                      </p:to>
+                                    </p:set>
+                                  </p:childTnLst>
+                                </p:cTn>
+                              </p:par>
+                            </p:childTnLst>
+                          </p:cTn>
+                        </p:par>
+                      </p:childTnLst>
+                    </p:cTn>
+                  </p:par>
+                </p:childTnLst>
+              </p:cTn>
+              <p:prevCondLst>
+                <p:cond evt="onPrev" delay="0">
+                  <p:tgtEl>
+                    <p:sldTgt/>
+                  </p:tgtEl>
+                </p:cond>
+              </p:prevCondLst>
+              <p:nextCondLst>
+                <p:cond evt="onNext" delay="0">
+                  <p:tgtEl>
+                    <p:sldTgt/>
+                  </p:tgtEl>
+                </p:cond>
+              </p:nextCondLst>
+            </p:seq>
+          </p:childTnLst>
+        </p:cTn>
+      </p:par>
+    </p:tnLst>
+    <p:bldLst>
+      <p:bldP spid="42" grpId="0"/>
+      <p:bldP spid="51" grpId="0" animBg="1"/>
+    </p:bldLst>
+  </p:timing>
 </p:sld>
 </file>
 
 <file path=ppt/slides/slide4.xml><?xml version="1.0" encoding="utf-8"?>
-<p:sld xmlns:a="http://schemas.openxmlformats.org/drawingml/2006/main" xmlns:r="http://schemas.openxmlformats.org/officeDocument/2006/relationships" xmlns:p="http://schemas.openxmlformats.org/presentationml/2006/main" show="0">
-  <p:cSld>
-    <p:spTree>
-      <p:nvGrpSpPr>
-        <p:cNvPr id="1" name="">
-          <a:extLst>
-            <a:ext uri="{FF2B5EF4-FFF2-40B4-BE49-F238E27FC236}">
-              <a16:creationId xmlns:a16="http://schemas.microsoft.com/office/drawing/2014/main" id="{1F318A3F-3E99-6EEF-18D8-51458A2921C7}"/>
-            </a:ext>
-          </a:extLst>
-        </p:cNvPr>
-        <p:cNvGrpSpPr/>
-        <p:nvPr/>
-      </p:nvGrpSpPr>
-      <p:grpSpPr>
-        <a:xfrm>
-          <a:off x="0" y="0"/>
-          <a:ext cx="0" cy="0"/>
-          <a:chOff x="0" y="0"/>
-          <a:chExt cx="0" cy="0"/>
-        </a:xfrm>
-      </p:grpSpPr>
-      <p:pic>
-        <p:nvPicPr>
-          <p:cNvPr id="4" name="Picture 3" descr="A black and gold chess piece&#10;&#10;Description automatically generated">
-            <a:extLst>
-              <a:ext uri="{FF2B5EF4-FFF2-40B4-BE49-F238E27FC236}">
-                <a16:creationId xmlns:a16="http://schemas.microsoft.com/office/drawing/2014/main" id="{3099D8F2-8243-04F3-FF99-F8EB4913A733}"/>
-              </a:ext>
-            </a:extLst>
-          </p:cNvPr>
-          <p:cNvPicPr>
-            <a:picLocks noChangeAspect="1"/>
-          </p:cNvPicPr>
-          <p:nvPr/>
-        </p:nvPicPr>
-        <p:blipFill rotWithShape="1">
-          <a:blip r:embed="rId2"/>
-          <a:srcRect l="522" r="1855"/>
-          <a:stretch/>
-        </p:blipFill>
-        <p:spPr>
-          <a:xfrm>
-            <a:off x="2" y="10"/>
-            <a:ext cx="6694955" cy="6857990"/>
-          </a:xfrm>
-          <a:custGeom>
-            <a:avLst/>
-            <a:gdLst>
-              <a:gd name="connsiteX0" fmla="*/ 0 w 6694955"/>
-              <a:gd name="connsiteY0" fmla="*/ 0 h 6858000"/>
-              <a:gd name="connsiteX1" fmla="*/ 6694955 w 6694955"/>
-              <a:gd name="connsiteY1" fmla="*/ 0 h 6858000"/>
-              <a:gd name="connsiteX2" fmla="*/ 2589160 w 6694955"/>
-              <a:gd name="connsiteY2" fmla="*/ 6857732 h 6858000"/>
-              <a:gd name="connsiteX3" fmla="*/ 0 w 6694955"/>
-              <a:gd name="connsiteY3" fmla="*/ 6858000 h 6858000"/>
-            </a:gdLst>
-            <a:ahLst/>
-            <a:cxnLst>
-              <a:cxn ang="0">
-                <a:pos x="connsiteX0" y="connsiteY0"/>
-              </a:cxn>
-              <a:cxn ang="0">
-                <a:pos x="connsiteX1" y="connsiteY1"/>
-              </a:cxn>
-              <a:cxn ang="0">
-                <a:pos x="connsiteX2" y="connsiteY2"/>
-              </a:cxn>
-              <a:cxn ang="0">
-                <a:pos x="connsiteX3" y="connsiteY3"/>
-              </a:cxn>
-            </a:cxnLst>
-            <a:rect l="l" t="t" r="r" b="b"/>
-            <a:pathLst>
-              <a:path w="6694955" h="6858000">
-                <a:moveTo>
-                  <a:pt x="0" y="0"/>
-                </a:moveTo>
-                <a:lnTo>
-                  <a:pt x="6694955" y="0"/>
-                </a:lnTo>
-                <a:lnTo>
-                  <a:pt x="2589160" y="6857732"/>
-                </a:lnTo>
-                <a:lnTo>
-                  <a:pt x="0" y="6858000"/>
-                </a:lnTo>
-                <a:close/>
-              </a:path>
-            </a:pathLst>
-          </a:custGeom>
-          <a:noFill/>
-        </p:spPr>
-      </p:pic>
-      <p:sp>
-        <p:nvSpPr>
-          <p:cNvPr id="34" name="Text Placeholder 6">
-            <a:extLst>
-              <a:ext uri="{FF2B5EF4-FFF2-40B4-BE49-F238E27FC236}">
-                <a16:creationId xmlns:a16="http://schemas.microsoft.com/office/drawing/2014/main" id="{D6268386-D9D1-51D9-8E34-034C23459262}"/>
-              </a:ext>
-            </a:extLst>
-          </p:cNvPr>
-          <p:cNvSpPr>
-            <a:spLocks noGrp="1"/>
-          </p:cNvSpPr>
-          <p:nvPr>
-            <p:ph type="body" sz="quarter" idx="13"/>
-          </p:nvPr>
-        </p:nvSpPr>
-        <p:spPr>
-          <a:xfrm>
-            <a:off x="6144768" y="2069658"/>
-            <a:ext cx="5042568" cy="345476"/>
-          </a:xfrm>
-        </p:spPr>
-        <p:txBody>
-          <a:bodyPr anchor="ctr">
-            <a:normAutofit/>
-          </a:bodyPr>
-          <a:lstStyle/>
-          <a:p>
-            <a:r>
-              <a:rPr lang="en-US" dirty="0"/>
-              <a:t>Oct 20XX</a:t>
-            </a:r>
-          </a:p>
-        </p:txBody>
-      </p:sp>
-      <p:sp>
-        <p:nvSpPr>
-          <p:cNvPr id="31" name="Text Placeholder 3">
-            <a:extLst>
-              <a:ext uri="{FF2B5EF4-FFF2-40B4-BE49-F238E27FC236}">
-                <a16:creationId xmlns:a16="http://schemas.microsoft.com/office/drawing/2014/main" id="{E5408563-BD5B-3BFF-51F7-8E04B010C5A7}"/>
-              </a:ext>
-            </a:extLst>
-          </p:cNvPr>
-          <p:cNvSpPr>
-            <a:spLocks noGrp="1"/>
-          </p:cNvSpPr>
-          <p:nvPr>
-            <p:ph type="body" sz="quarter" idx="15"/>
-          </p:nvPr>
-        </p:nvSpPr>
-        <p:spPr>
-          <a:xfrm>
-            <a:off x="6144768" y="2415134"/>
-            <a:ext cx="5041422" cy="540104"/>
-          </a:xfrm>
-        </p:spPr>
-        <p:txBody>
-          <a:bodyPr>
-            <a:normAutofit/>
-          </a:bodyPr>
-          <a:lstStyle/>
-          <a:p>
-            <a:r>
-              <a:rPr lang="en-US" dirty="0"/>
-              <a:t>Roll out product to local schools to establish new STEM curriculum</a:t>
-            </a:r>
-          </a:p>
-        </p:txBody>
-      </p:sp>
-      <p:sp>
-        <p:nvSpPr>
-          <p:cNvPr id="2" name="Title 1">
-            <a:extLst>
-              <a:ext uri="{FF2B5EF4-FFF2-40B4-BE49-F238E27FC236}">
-                <a16:creationId xmlns:a16="http://schemas.microsoft.com/office/drawing/2014/main" id="{5D7A7977-3BF5-32EE-4727-F6799EC035A9}"/>
-              </a:ext>
-            </a:extLst>
-          </p:cNvPr>
-          <p:cNvSpPr>
-            <a:spLocks noGrp="1"/>
-          </p:cNvSpPr>
-          <p:nvPr>
-            <p:ph type="title"/>
-          </p:nvPr>
-        </p:nvSpPr>
-        <p:spPr>
-          <a:xfrm>
-            <a:off x="6971633" y="690928"/>
-            <a:ext cx="4501910" cy="732282"/>
-          </a:xfrm>
-        </p:spPr>
-        <p:txBody>
-          <a:bodyPr anchor="b">
-            <a:normAutofit/>
-          </a:bodyPr>
-          <a:lstStyle/>
-          <a:p>
-            <a:r>
-              <a:rPr lang="en-ZA" dirty="0" err="1"/>
-              <a:t>Unsere</a:t>
-            </a:r>
-            <a:r>
-              <a:rPr lang="en-ZA" dirty="0"/>
-              <a:t> Idee </a:t>
-            </a:r>
-            <a:r>
-              <a:rPr lang="en-ZA" dirty="0" err="1"/>
-              <a:t>im</a:t>
-            </a:r>
-            <a:r>
-              <a:rPr lang="en-ZA" dirty="0"/>
-              <a:t> detail</a:t>
-            </a:r>
-          </a:p>
-        </p:txBody>
-      </p:sp>
-      <p:sp>
-        <p:nvSpPr>
-          <p:cNvPr id="11" name="Slide Number Placeholder 10">
-            <a:extLst>
-              <a:ext uri="{FF2B5EF4-FFF2-40B4-BE49-F238E27FC236}">
-                <a16:creationId xmlns:a16="http://schemas.microsoft.com/office/drawing/2014/main" id="{A0A4CB93-76AE-3A8E-DC06-1830ADA8E628}"/>
-              </a:ext>
-            </a:extLst>
-          </p:cNvPr>
-          <p:cNvSpPr>
-            <a:spLocks noGrp="1"/>
-          </p:cNvSpPr>
-          <p:nvPr>
-            <p:ph type="sldNum" sz="quarter" idx="22"/>
-          </p:nvPr>
-        </p:nvSpPr>
-        <p:spPr>
-          <a:xfrm>
-            <a:off x="8610600" y="6356350"/>
-            <a:ext cx="2743200" cy="365125"/>
-          </a:xfrm>
-        </p:spPr>
-        <p:txBody>
-          <a:bodyPr anchor="ctr">
-            <a:normAutofit/>
-          </a:bodyPr>
-          <a:lstStyle/>
-          <a:p>
-            <a:pPr>
-              <a:spcAft>
-                <a:spcPts val="600"/>
-              </a:spcAft>
-            </a:pPr>
-            <a:fld id="{B5CEABB6-07DC-46E8-9B57-56EC44A396E5}" type="slidenum">
-              <a:rPr lang="en-US" smtClean="0"/>
-              <a:pPr>
-                <a:spcAft>
-                  <a:spcPts val="600"/>
-                </a:spcAft>
-              </a:pPr>
-              <a:t>4</a:t>
-            </a:fld>
-            <a:endParaRPr lang="en-US"/>
-          </a:p>
-        </p:txBody>
-      </p:sp>
-      <p:sp>
-        <p:nvSpPr>
-          <p:cNvPr id="30" name="Content Placeholder 2">
-            <a:extLst>
-              <a:ext uri="{FF2B5EF4-FFF2-40B4-BE49-F238E27FC236}">
-                <a16:creationId xmlns:a16="http://schemas.microsoft.com/office/drawing/2014/main" id="{5C8300CC-9848-2565-D78A-00460529C98D}"/>
-              </a:ext>
-            </a:extLst>
-          </p:cNvPr>
-          <p:cNvSpPr>
-            <a:spLocks noGrp="1"/>
-          </p:cNvSpPr>
-          <p:nvPr>
-            <p:ph type="body" sz="quarter" idx="23"/>
-          </p:nvPr>
-        </p:nvSpPr>
-        <p:spPr>
-          <a:xfrm>
-            <a:off x="5300006" y="3587638"/>
-            <a:ext cx="5042568" cy="320381"/>
-          </a:xfrm>
-        </p:spPr>
-        <p:txBody>
-          <a:bodyPr vert="horz" lIns="0" tIns="45720" rIns="91440" bIns="45720" rtlCol="0" anchor="ctr">
-            <a:normAutofit/>
-          </a:bodyPr>
-          <a:lstStyle/>
-          <a:p>
-            <a:r>
-              <a:rPr lang="en-US" sz="1500"/>
-              <a:t>Feb 20XX</a:t>
-            </a:r>
-          </a:p>
-        </p:txBody>
-      </p:sp>
-      <p:sp>
-        <p:nvSpPr>
-          <p:cNvPr id="33" name="Text Placeholder 5">
-            <a:extLst>
-              <a:ext uri="{FF2B5EF4-FFF2-40B4-BE49-F238E27FC236}">
-                <a16:creationId xmlns:a16="http://schemas.microsoft.com/office/drawing/2014/main" id="{8729F8B3-153C-6F71-2013-DF96789C3BD1}"/>
-              </a:ext>
-            </a:extLst>
-          </p:cNvPr>
-          <p:cNvSpPr>
-            <a:spLocks noGrp="1"/>
-          </p:cNvSpPr>
-          <p:nvPr>
-            <p:ph type="body" sz="quarter" idx="24"/>
-          </p:nvPr>
-        </p:nvSpPr>
-        <p:spPr>
-          <a:xfrm>
-            <a:off x="5300007" y="3933114"/>
-            <a:ext cx="5041422" cy="540104"/>
-          </a:xfrm>
-        </p:spPr>
-        <p:txBody>
-          <a:bodyPr>
-            <a:normAutofit/>
-          </a:bodyPr>
-          <a:lstStyle/>
-          <a:p>
-            <a:r>
-              <a:rPr lang="en-US" dirty="0"/>
-              <a:t>Release to regional school districts and monitor trends in each school</a:t>
-            </a:r>
-          </a:p>
-          <a:p>
-            <a:endParaRPr lang="en-US" dirty="0"/>
-          </a:p>
-        </p:txBody>
-      </p:sp>
-      <p:sp>
-        <p:nvSpPr>
-          <p:cNvPr id="32" name="Text Placeholder 4">
-            <a:extLst>
-              <a:ext uri="{FF2B5EF4-FFF2-40B4-BE49-F238E27FC236}">
-                <a16:creationId xmlns:a16="http://schemas.microsoft.com/office/drawing/2014/main" id="{BDF3ABFD-11F1-72E7-3D09-151DFFEC42A6}"/>
-              </a:ext>
-            </a:extLst>
-          </p:cNvPr>
-          <p:cNvSpPr>
-            <a:spLocks noGrp="1"/>
-          </p:cNvSpPr>
-          <p:nvPr>
-            <p:ph type="body" sz="quarter" idx="25"/>
-          </p:nvPr>
-        </p:nvSpPr>
-        <p:spPr>
-          <a:xfrm>
-            <a:off x="4398264" y="5105618"/>
-            <a:ext cx="5042568" cy="320381"/>
-          </a:xfrm>
-        </p:spPr>
-        <p:txBody>
-          <a:bodyPr anchor="ctr">
-            <a:normAutofit/>
-          </a:bodyPr>
-          <a:lstStyle/>
-          <a:p>
-            <a:r>
-              <a:rPr lang="en-US" sz="1500"/>
-              <a:t>May 20XX</a:t>
-            </a:r>
-          </a:p>
-        </p:txBody>
-      </p:sp>
-      <p:sp>
-        <p:nvSpPr>
-          <p:cNvPr id="35" name="Text Placeholder 7">
-            <a:extLst>
-              <a:ext uri="{FF2B5EF4-FFF2-40B4-BE49-F238E27FC236}">
-                <a16:creationId xmlns:a16="http://schemas.microsoft.com/office/drawing/2014/main" id="{AC58EA9E-3629-D1C4-45A9-B3D774BBFBB8}"/>
-              </a:ext>
-            </a:extLst>
-          </p:cNvPr>
-          <p:cNvSpPr>
-            <a:spLocks noGrp="1"/>
-          </p:cNvSpPr>
-          <p:nvPr>
-            <p:ph type="body" sz="quarter" idx="26"/>
-          </p:nvPr>
-        </p:nvSpPr>
-        <p:spPr>
-          <a:xfrm>
-            <a:off x="4398264" y="5451094"/>
-            <a:ext cx="5041422" cy="540104"/>
-          </a:xfrm>
-        </p:spPr>
-        <p:txBody>
-          <a:bodyPr>
-            <a:normAutofit/>
-          </a:bodyPr>
-          <a:lstStyle/>
-          <a:p>
-            <a:r>
-              <a:rPr lang="en-US" sz="1100"/>
-              <a:t>Gather feedback from teachers and continue to expand availability of the product</a:t>
-            </a:r>
-          </a:p>
-          <a:p>
-            <a:endParaRPr lang="en-US" sz="1100"/>
-          </a:p>
-        </p:txBody>
-      </p:sp>
-    </p:spTree>
-    <p:extLst>
-      <p:ext uri="{BB962C8B-B14F-4D97-AF65-F5344CB8AC3E}">
-        <p14:creationId xmlns:p14="http://schemas.microsoft.com/office/powerpoint/2010/main" val="2122670279"/>
-      </p:ext>
-    </p:extLst>
-  </p:cSld>
-  <p:clrMapOvr>
-    <a:masterClrMapping/>
-  </p:clrMapOvr>
-</p:sld>
-</file>
-
-<file path=ppt/slides/slide5.xml><?xml version="1.0" encoding="utf-8"?>
 <p:sld xmlns:a="http://schemas.openxmlformats.org/drawingml/2006/main" xmlns:r="http://schemas.openxmlformats.org/officeDocument/2006/relationships" xmlns:p="http://schemas.openxmlformats.org/presentationml/2006/main">
   <p:cSld>
     <p:spTree>
@@ -19541,7 +18088,7 @@
             <a:fld id="{B5CEABB6-07DC-46E8-9B57-56EC44A396E5}" type="slidenum">
               <a:rPr lang="en-US" smtClean="0"/>
               <a:pPr/>
-              <a:t>5</a:t>
+              <a:t>4</a:t>
             </a:fld>
             <a:endParaRPr lang="en-US" dirty="0"/>
           </a:p>
@@ -20587,7 +19134,7 @@
         <p:spPr>
           <a:xfrm>
             <a:off x="3697643" y="3028335"/>
-            <a:ext cx="1220095" cy="430887"/>
+            <a:ext cx="1329234" cy="430887"/>
           </a:xfrm>
           <a:prstGeom prst="rect">
             <a:avLst/>
@@ -20621,7 +19168,7 @@
                   <a:schemeClr val="bg1"/>
                 </a:solidFill>
               </a:rPr>
-              <a:t>tändis</a:t>
+              <a:t>tändnis</a:t>
             </a:r>
             <a:r>
               <a:rPr lang="de-DE" sz="1100" dirty="0">
@@ -20946,7 +19493,7 @@
 </p:sld>
 </file>
 
-<file path=ppt/slides/slide6.xml><?xml version="1.0" encoding="utf-8"?>
+<file path=ppt/slides/slide5.xml><?xml version="1.0" encoding="utf-8"?>
 <p:sld xmlns:a="http://schemas.openxmlformats.org/drawingml/2006/main" xmlns:r="http://schemas.openxmlformats.org/officeDocument/2006/relationships" xmlns:p="http://schemas.openxmlformats.org/presentationml/2006/main">
   <p:cSld>
     <p:spTree>
@@ -21148,7 +19695,7 @@
             <a:fld id="{19B51A1E-902D-48AF-9020-955120F399B6}" type="slidenum">
               <a:rPr lang="en-ZA" smtClean="0"/>
               <a:pPr/>
-              <a:t>6</a:t>
+              <a:t>5</a:t>
             </a:fld>
             <a:endParaRPr lang="en-ZA" dirty="0"/>
           </a:p>
@@ -21535,7 +20082,7 @@
 </p:sld>
 </file>
 
-<file path=ppt/slides/slide7.xml><?xml version="1.0" encoding="utf-8"?>
+<file path=ppt/slides/slide6.xml><?xml version="1.0" encoding="utf-8"?>
 <p:sld xmlns:a="http://schemas.openxmlformats.org/drawingml/2006/main" xmlns:r="http://schemas.openxmlformats.org/officeDocument/2006/relationships" xmlns:p="http://schemas.openxmlformats.org/presentationml/2006/main">
   <p:cSld>
     <p:spTree>
@@ -21625,7 +20172,7 @@
             <a:fld id="{19B51A1E-902D-48AF-9020-955120F399B6}" type="slidenum">
               <a:rPr lang="en-ZA" smtClean="0"/>
               <a:pPr/>
-              <a:t>7</a:t>
+              <a:t>6</a:t>
             </a:fld>
             <a:endParaRPr lang="en-ZA" dirty="0"/>
           </a:p>
@@ -21674,7 +20221,7 @@
 </p:sld>
 </file>
 
-<file path=ppt/slides/slide8.xml><?xml version="1.0" encoding="utf-8"?>
+<file path=ppt/slides/slide7.xml><?xml version="1.0" encoding="utf-8"?>
 <p:sld xmlns:a="http://schemas.openxmlformats.org/drawingml/2006/main" xmlns:r="http://schemas.openxmlformats.org/officeDocument/2006/relationships" xmlns:p="http://schemas.openxmlformats.org/presentationml/2006/main">
   <p:cSld>
     <p:spTree>
@@ -21955,7 +20502,7 @@
             <a:fld id="{19B51A1E-902D-48AF-9020-955120F399B6}" type="slidenum">
               <a:rPr lang="en-ZA" smtClean="0"/>
               <a:pPr/>
-              <a:t>8</a:t>
+              <a:t>7</a:t>
             </a:fld>
             <a:endParaRPr lang="en-ZA" dirty="0"/>
           </a:p>
@@ -22311,7 +20858,7 @@
 </p:sld>
 </file>
 
-<file path=ppt/slides/slide9.xml><?xml version="1.0" encoding="utf-8"?>
+<file path=ppt/slides/slide8.xml><?xml version="1.0" encoding="utf-8"?>
 <p:sld xmlns:a="http://schemas.openxmlformats.org/drawingml/2006/main" xmlns:r="http://schemas.openxmlformats.org/officeDocument/2006/relationships" xmlns:p="http://schemas.openxmlformats.org/presentationml/2006/main">
   <p:cSld>
     <p:spTree>
@@ -22319,7 +20866,7 @@
         <p:cNvPr id="1" name="">
           <a:extLst>
             <a:ext uri="{FF2B5EF4-FFF2-40B4-BE49-F238E27FC236}">
-              <a16:creationId xmlns:a16="http://schemas.microsoft.com/office/drawing/2014/main" id="{9420CA90-746E-375B-1EC6-15A36224798E}"/>
+              <a16:creationId xmlns:a16="http://schemas.microsoft.com/office/drawing/2014/main" id="{71A08319-F0E7-5357-2596-2D7CCA3C7A34}"/>
             </a:ext>
           </a:extLst>
         </p:cNvPr>
@@ -22339,7 +20886,7 @@
           <p:cNvPr id="2" name="Title 1">
             <a:extLst>
               <a:ext uri="{FF2B5EF4-FFF2-40B4-BE49-F238E27FC236}">
-                <a16:creationId xmlns:a16="http://schemas.microsoft.com/office/drawing/2014/main" id="{DEA00EB2-8F3C-7DDA-2EA4-87BD0589F40A}"/>
+                <a16:creationId xmlns:a16="http://schemas.microsoft.com/office/drawing/2014/main" id="{6D1DA9BD-1BD3-8E42-CB46-AFB7D4AF0F65}"/>
               </a:ext>
             </a:extLst>
           </p:cNvPr>
@@ -22381,7 +20928,7 @@
           <p:cNvPr id="4" name="Slide Number Placeholder 3">
             <a:extLst>
               <a:ext uri="{FF2B5EF4-FFF2-40B4-BE49-F238E27FC236}">
-                <a16:creationId xmlns:a16="http://schemas.microsoft.com/office/drawing/2014/main" id="{8A46A83A-2148-04DD-8613-0F6522F6820C}"/>
+                <a16:creationId xmlns:a16="http://schemas.microsoft.com/office/drawing/2014/main" id="{5AE465EC-E3F6-4273-C2DE-D4C2E5487A45}"/>
               </a:ext>
             </a:extLst>
           </p:cNvPr>
@@ -22402,12 +20949,77 @@
           <a:bodyPr/>
           <a:lstStyle/>
           <a:p>
+            <a:pPr marL="0" marR="0" lvl="0" indent="0" algn="r" defTabSz="914400" rtl="0" eaLnBrk="1" fontAlgn="auto" latinLnBrk="0" hangingPunct="1">
+              <a:lnSpc>
+                <a:spcPct val="100000"/>
+              </a:lnSpc>
+              <a:spcBef>
+                <a:spcPts val="0"/>
+              </a:spcBef>
+              <a:spcAft>
+                <a:spcPts val="0"/>
+              </a:spcAft>
+              <a:buClrTx/>
+              <a:buSzTx/>
+              <a:buFontTx/>
+              <a:buNone/>
+              <a:tabLst/>
+              <a:defRPr/>
+            </a:pPr>
             <a:fld id="{19B51A1E-902D-48AF-9020-955120F399B6}" type="slidenum">
-              <a:rPr lang="en-ZA" smtClean="0"/>
-              <a:pPr/>
-              <a:t>9</a:t>
+              <a:rPr kumimoji="0" lang="en-ZA" sz="900" b="0" i="0" u="none" strike="noStrike" kern="1200" cap="none" spc="0" normalizeH="0" baseline="0" noProof="0" smtClean="0">
+                <a:ln>
+                  <a:noFill/>
+                </a:ln>
+                <a:solidFill>
+                  <a:srgbClr val="1E1E1E">
+                    <a:lumMod val="50000"/>
+                    <a:lumOff val="50000"/>
+                  </a:srgbClr>
+                </a:solidFill>
+                <a:effectLst/>
+                <a:uLnTx/>
+                <a:uFillTx/>
+                <a:latin typeface="Source Sans Pro"/>
+                <a:ea typeface="+mn-ea"/>
+                <a:cs typeface="+mn-cs"/>
+              </a:rPr>
+              <a:pPr marL="0" marR="0" lvl="0" indent="0" algn="r" defTabSz="914400" rtl="0" eaLnBrk="1" fontAlgn="auto" latinLnBrk="0" hangingPunct="1">
+                <a:lnSpc>
+                  <a:spcPct val="100000"/>
+                </a:lnSpc>
+                <a:spcBef>
+                  <a:spcPts val="0"/>
+                </a:spcBef>
+                <a:spcAft>
+                  <a:spcPts val="0"/>
+                </a:spcAft>
+                <a:buClrTx/>
+                <a:buSzTx/>
+                <a:buFontTx/>
+                <a:buNone/>
+                <a:tabLst/>
+                <a:defRPr/>
+              </a:pPr>
+              <a:t>8</a:t>
             </a:fld>
-            <a:endParaRPr lang="en-ZA" dirty="0"/>
+            <a:endParaRPr kumimoji="0" lang="en-ZA" sz="900" b="0" i="0" u="none" strike="noStrike" kern="1200" cap="none" spc="0" normalizeH="0" baseline="0" noProof="0" dirty="0">
+              <a:ln>
+                <a:noFill/>
+              </a:ln>
+              <a:solidFill>
+                <a:srgbClr val="1E1E1E">
+                  <a:lumMod val="50000"/>
+                  <a:lumOff val="50000"/>
+                </a:srgbClr>
+              </a:solidFill>
+              <a:effectLst/>
+              <a:uLnTx/>
+              <a:uFillTx/>
+              <a:latin typeface="Source Sans Pro"/>
+              <a:ea typeface="+mn-ea"/>
+              <a:cs typeface="+mn-cs"/>
+            </a:endParaRPr>
           </a:p>
         </p:txBody>
       </p:sp>
@@ -22416,7 +21028,7 @@
           <p:cNvPr id="1026" name="Picture 2">
             <a:extLst>
               <a:ext uri="{FF2B5EF4-FFF2-40B4-BE49-F238E27FC236}">
-                <a16:creationId xmlns:a16="http://schemas.microsoft.com/office/drawing/2014/main" id="{B558A73C-E407-52A0-634E-91EBE2E063EB}"/>
+                <a16:creationId xmlns:a16="http://schemas.microsoft.com/office/drawing/2014/main" id="{37DDE6FF-2F86-BF8D-9BA9-6DEB36E913AF}"/>
               </a:ext>
             </a:extLst>
           </p:cNvPr>
@@ -22440,8 +21052,8 @@
         </p:blipFill>
         <p:spPr bwMode="auto">
           <a:xfrm>
-            <a:off x="821268" y="2514599"/>
-            <a:ext cx="2455334" cy="2455334"/>
+            <a:off x="3758871" y="2796329"/>
+            <a:ext cx="1710815" cy="1710815"/>
           </a:xfrm>
           <a:prstGeom prst="rect">
             <a:avLst/>
@@ -22463,7 +21075,7 @@
           <p:cNvPr id="33" name="Textfeld 32">
             <a:extLst>
               <a:ext uri="{FF2B5EF4-FFF2-40B4-BE49-F238E27FC236}">
-                <a16:creationId xmlns:a16="http://schemas.microsoft.com/office/drawing/2014/main" id="{C7BF2ABD-862C-C6AB-1BD4-855EB0B8A440}"/>
+                <a16:creationId xmlns:a16="http://schemas.microsoft.com/office/drawing/2014/main" id="{219E2C55-6E97-748F-3417-63ACC1540233}"/>
               </a:ext>
             </a:extLst>
           </p:cNvPr>
@@ -22472,8 +21084,8 @@
         </p:nvSpPr>
         <p:spPr>
           <a:xfrm>
-            <a:off x="4707467" y="2957436"/>
-            <a:ext cx="2556933" cy="1569660"/>
+            <a:off x="7011020" y="3130070"/>
+            <a:ext cx="1782807" cy="1015663"/>
           </a:xfrm>
           <a:prstGeom prst="rect">
             <a:avLst/>
@@ -22486,10 +21098,54 @@
           </a:bodyPr>
           <a:lstStyle/>
           <a:p>
-            <a:r>
-              <a:rPr lang="en-US" sz="9600" dirty="0"/>
+            <a:pPr marL="0" marR="0" lvl="0" indent="0" algn="l" defTabSz="914400" rtl="0" eaLnBrk="1" fontAlgn="auto" latinLnBrk="0" hangingPunct="1">
+              <a:lnSpc>
+                <a:spcPct val="100000"/>
+              </a:lnSpc>
+              <a:spcBef>
+                <a:spcPts val="0"/>
+              </a:spcBef>
+              <a:spcAft>
+                <a:spcPts val="0"/>
+              </a:spcAft>
+              <a:buClrTx/>
+              <a:buSzTx/>
+              <a:buFontTx/>
+              <a:buNone/>
+              <a:tabLst/>
+              <a:defRPr/>
+            </a:pPr>
+            <a:r>
+              <a:rPr kumimoji="0" lang="en-US" sz="6000" b="0" i="0" u="none" strike="noStrike" kern="1200" cap="none" spc="0" normalizeH="0" baseline="0" noProof="0" dirty="0">
+                <a:ln>
+                  <a:noFill/>
+                </a:ln>
+                <a:solidFill>
+                  <a:prstClr val="white"/>
+                </a:solidFill>
+                <a:effectLst/>
+                <a:uLnTx/>
+                <a:uFillTx/>
+                <a:latin typeface="Source Sans Pro"/>
+                <a:ea typeface="+mn-ea"/>
+                <a:cs typeface="+mn-cs"/>
+              </a:rPr>
               <a:t>LLM</a:t>
             </a:r>
+            <a:endParaRPr kumimoji="0" lang="en-US" sz="7200" b="0" i="0" u="none" strike="noStrike" kern="1200" cap="none" spc="0" normalizeH="0" baseline="0" noProof="0" dirty="0">
+              <a:ln>
+                <a:noFill/>
+              </a:ln>
+              <a:solidFill>
+                <a:prstClr val="white"/>
+              </a:solidFill>
+              <a:effectLst/>
+              <a:uLnTx/>
+              <a:uFillTx/>
+              <a:latin typeface="Source Sans Pro"/>
+              <a:ea typeface="+mn-ea"/>
+              <a:cs typeface="+mn-cs"/>
+            </a:endParaRPr>
           </a:p>
         </p:txBody>
       </p:sp>
@@ -22498,7 +21154,7 @@
           <p:cNvPr id="44" name="Grafik 43">
             <a:extLst>
               <a:ext uri="{FF2B5EF4-FFF2-40B4-BE49-F238E27FC236}">
-                <a16:creationId xmlns:a16="http://schemas.microsoft.com/office/drawing/2014/main" id="{EC2CB27E-1916-0001-917D-5B4A813ECE05}"/>
+                <a16:creationId xmlns:a16="http://schemas.microsoft.com/office/drawing/2014/main" id="{79652CBA-94F8-3E73-0244-8E876E816112}"/>
               </a:ext>
             </a:extLst>
           </p:cNvPr>
@@ -22515,8 +21171,8 @@
         </p:blipFill>
         <p:spPr>
           <a:xfrm>
-            <a:off x="8449734" y="2343422"/>
-            <a:ext cx="2394860" cy="2394860"/>
+            <a:off x="9524364" y="2319182"/>
+            <a:ext cx="2025378" cy="2025378"/>
           </a:xfrm>
           <a:prstGeom prst="rect">
             <a:avLst/>
@@ -22525,10 +21181,10 @@
       </p:pic>
       <p:sp>
         <p:nvSpPr>
-          <p:cNvPr id="45" name="Textfeld 44">
-            <a:extLst>
-              <a:ext uri="{FF2B5EF4-FFF2-40B4-BE49-F238E27FC236}">
-                <a16:creationId xmlns:a16="http://schemas.microsoft.com/office/drawing/2014/main" id="{F3BC4B8E-7847-BC24-E2A8-123AB973A4DF}"/>
+          <p:cNvPr id="3" name="Textfeld 2">
+            <a:extLst>
+              <a:ext uri="{FF2B5EF4-FFF2-40B4-BE49-F238E27FC236}">
+                <a16:creationId xmlns:a16="http://schemas.microsoft.com/office/drawing/2014/main" id="{9305E915-0863-E2A4-2A78-24DC898E1288}"/>
               </a:ext>
             </a:extLst>
           </p:cNvPr>
@@ -22537,8 +21193,8 @@
         </p:nvSpPr>
         <p:spPr>
           <a:xfrm>
-            <a:off x="3306236" y="3221251"/>
-            <a:ext cx="846667" cy="415498"/>
+            <a:off x="951361" y="3130070"/>
+            <a:ext cx="1710816" cy="1015663"/>
           </a:xfrm>
           <a:prstGeom prst="rect">
             <a:avLst/>
@@ -22551,106 +21207,63 @@
           </a:bodyPr>
           <a:lstStyle/>
           <a:p>
-            <a:r>
-              <a:rPr lang="en-US" sz="1050" dirty="0"/>
-              <a:t> Parameter</a:t>
-            </a:r>
-          </a:p>
-          <a:p>
-            <a:r>
-              <a:rPr lang="en-US" sz="1050" dirty="0"/>
-              <a:t>        von</a:t>
-            </a:r>
-            <a:endParaRPr lang="en-US" dirty="0"/>
-          </a:p>
-        </p:txBody>
-      </p:sp>
-      <p:sp>
-        <p:nvSpPr>
-          <p:cNvPr id="49" name="Textfeld 48">
-            <a:extLst>
-              <a:ext uri="{FF2B5EF4-FFF2-40B4-BE49-F238E27FC236}">
-                <a16:creationId xmlns:a16="http://schemas.microsoft.com/office/drawing/2014/main" id="{5A1FB404-7353-9C70-3A5C-B5FE4D61BBC2}"/>
-              </a:ext>
-            </a:extLst>
-          </p:cNvPr>
-          <p:cNvSpPr txBox="1"/>
-          <p:nvPr/>
-        </p:nvSpPr>
-        <p:spPr>
-          <a:xfrm>
-            <a:off x="3335866" y="3971498"/>
-            <a:ext cx="846667" cy="253916"/>
-          </a:xfrm>
-          <a:prstGeom prst="rect">
-            <a:avLst/>
-          </a:prstGeom>
-          <a:noFill/>
-        </p:spPr>
-        <p:txBody>
-          <a:bodyPr wrap="square" rtlCol="0">
-            <a:spAutoFit/>
-          </a:bodyPr>
-          <a:lstStyle/>
-          <a:p>
-            <a:r>
-              <a:rPr lang="en-US" sz="1050" dirty="0"/>
-              <a:t>Evaluation</a:t>
-            </a:r>
-            <a:endParaRPr lang="en-US" dirty="0"/>
-          </a:p>
-        </p:txBody>
-      </p:sp>
-      <p:sp>
-        <p:nvSpPr>
-          <p:cNvPr id="51" name="Textfeld 50">
-            <a:extLst>
-              <a:ext uri="{FF2B5EF4-FFF2-40B4-BE49-F238E27FC236}">
-                <a16:creationId xmlns:a16="http://schemas.microsoft.com/office/drawing/2014/main" id="{EEA75197-AA97-3C6D-535E-35942864C82C}"/>
-              </a:ext>
-            </a:extLst>
-          </p:cNvPr>
-          <p:cNvSpPr txBox="1"/>
-          <p:nvPr/>
-        </p:nvSpPr>
-        <p:spPr>
-          <a:xfrm>
-            <a:off x="7450667" y="3413894"/>
-            <a:ext cx="846667" cy="253916"/>
-          </a:xfrm>
-          <a:prstGeom prst="rect">
-            <a:avLst/>
-          </a:prstGeom>
-          <a:noFill/>
-        </p:spPr>
-        <p:txBody>
-          <a:bodyPr wrap="square" rtlCol="0">
-            <a:spAutoFit/>
-          </a:bodyPr>
-          <a:lstStyle/>
-          <a:p>
-            <a:r>
-              <a:rPr lang="en-US" sz="1050" dirty="0" err="1"/>
-              <a:t>Erkl</a:t>
-            </a:r>
-            <a:r>
-              <a:rPr lang="de-DE" sz="1050" dirty="0"/>
-              <a:t>ä</a:t>
-            </a:r>
-            <a:r>
-              <a:rPr lang="en-US" sz="1050" dirty="0"/>
-              <a:t>rung</a:t>
-            </a:r>
-            <a:endParaRPr lang="en-US" dirty="0"/>
-          </a:p>
-        </p:txBody>
-      </p:sp>
-      <p:sp>
-        <p:nvSpPr>
-          <p:cNvPr id="3" name="Notched Right Arrow 2">
-            <a:extLst>
-              <a:ext uri="{FF2B5EF4-FFF2-40B4-BE49-F238E27FC236}">
-                <a16:creationId xmlns:a16="http://schemas.microsoft.com/office/drawing/2014/main" id="{4DF04C3D-C382-5979-57EB-1C86FD1EF327}"/>
+            <a:pPr marL="0" marR="0" lvl="0" indent="0" algn="l" defTabSz="914400" rtl="0" eaLnBrk="1" fontAlgn="auto" latinLnBrk="0" hangingPunct="1">
+              <a:lnSpc>
+                <a:spcPct val="100000"/>
+              </a:lnSpc>
+              <a:spcBef>
+                <a:spcPts val="0"/>
+              </a:spcBef>
+              <a:spcAft>
+                <a:spcPts val="0"/>
+              </a:spcAft>
+              <a:buClrTx/>
+              <a:buSzTx/>
+              <a:buFontTx/>
+              <a:buNone/>
+              <a:tabLst/>
+              <a:defRPr/>
+            </a:pPr>
+            <a:r>
+              <a:rPr kumimoji="0" lang="en-US" sz="6000" b="0" i="0" u="none" strike="noStrike" kern="1200" cap="none" spc="0" normalizeH="0" baseline="0" noProof="0" dirty="0">
+                <a:ln>
+                  <a:noFill/>
+                </a:ln>
+                <a:solidFill>
+                  <a:prstClr val="white"/>
+                </a:solidFill>
+                <a:effectLst/>
+                <a:uLnTx/>
+                <a:uFillTx/>
+                <a:latin typeface="Source Sans Pro"/>
+                <a:ea typeface="+mn-ea"/>
+                <a:cs typeface="+mn-cs"/>
+              </a:rPr>
+              <a:t>FEN</a:t>
+            </a:r>
+            <a:endParaRPr kumimoji="0" lang="en-US" sz="7200" b="0" i="0" u="none" strike="noStrike" kern="1200" cap="none" spc="0" normalizeH="0" baseline="0" noProof="0" dirty="0">
+              <a:ln>
+                <a:noFill/>
+              </a:ln>
+              <a:solidFill>
+                <a:prstClr val="white"/>
+              </a:solidFill>
+              <a:effectLst/>
+              <a:uLnTx/>
+              <a:uFillTx/>
+              <a:latin typeface="Source Sans Pro"/>
+              <a:ea typeface="+mn-ea"/>
+              <a:cs typeface="+mn-cs"/>
+            </a:endParaRPr>
+          </a:p>
+        </p:txBody>
+      </p:sp>
+      <p:sp>
+        <p:nvSpPr>
+          <p:cNvPr id="6" name="Notched Right Arrow 2">
+            <a:extLst>
+              <a:ext uri="{FF2B5EF4-FFF2-40B4-BE49-F238E27FC236}">
+                <a16:creationId xmlns:a16="http://schemas.microsoft.com/office/drawing/2014/main" id="{BAD1169A-8F6D-6C08-7976-4C6FEBEC4ACD}"/>
               </a:ext>
             </a:extLst>
           </p:cNvPr>
@@ -22659,7 +21272,7 @@
         </p:nvSpPr>
         <p:spPr>
           <a:xfrm>
-            <a:off x="3428997" y="3461778"/>
+            <a:off x="2661763" y="3371248"/>
             <a:ext cx="939803" cy="560975"/>
           </a:xfrm>
           <a:prstGeom prst="notchedRightArrow">
@@ -22722,10 +21335,10 @@
       </p:sp>
       <p:sp>
         <p:nvSpPr>
-          <p:cNvPr id="5" name="Notched Right Arrow 4">
-            <a:extLst>
-              <a:ext uri="{FF2B5EF4-FFF2-40B4-BE49-F238E27FC236}">
-                <a16:creationId xmlns:a16="http://schemas.microsoft.com/office/drawing/2014/main" id="{5DA102B3-D789-5C32-81C3-9EC25BDCA4E9}"/>
+          <p:cNvPr id="7" name="Notched Right Arrow 2">
+            <a:extLst>
+              <a:ext uri="{FF2B5EF4-FFF2-40B4-BE49-F238E27FC236}">
+                <a16:creationId xmlns:a16="http://schemas.microsoft.com/office/drawing/2014/main" id="{4E789106-2F11-1C7C-FF0F-A88485E921DA}"/>
               </a:ext>
             </a:extLst>
           </p:cNvPr>
@@ -22734,7 +21347,7 @@
         </p:nvSpPr>
         <p:spPr>
           <a:xfrm>
-            <a:off x="7450667" y="3541791"/>
+            <a:off x="5730321" y="3371247"/>
             <a:ext cx="939803" cy="560975"/>
           </a:xfrm>
           <a:prstGeom prst="notchedRightArrow">
@@ -22795,10 +21408,1549 @@
           </a:p>
         </p:txBody>
       </p:sp>
+      <p:sp>
+        <p:nvSpPr>
+          <p:cNvPr id="8" name="Notched Right Arrow 2">
+            <a:extLst>
+              <a:ext uri="{FF2B5EF4-FFF2-40B4-BE49-F238E27FC236}">
+                <a16:creationId xmlns:a16="http://schemas.microsoft.com/office/drawing/2014/main" id="{794F5E02-F2BB-56FD-8967-A53F70837B66}"/>
+              </a:ext>
+            </a:extLst>
+          </p:cNvPr>
+          <p:cNvSpPr/>
+          <p:nvPr/>
+        </p:nvSpPr>
+        <p:spPr>
+          <a:xfrm>
+            <a:off x="8793827" y="3371246"/>
+            <a:ext cx="939803" cy="560975"/>
+          </a:xfrm>
+          <a:prstGeom prst="notchedRightArrow">
+            <a:avLst/>
+          </a:prstGeom>
+          <a:gradFill>
+            <a:gsLst>
+              <a:gs pos="0">
+                <a:schemeClr val="accent1">
+                  <a:shade val="67500"/>
+                  <a:satMod val="115000"/>
+                </a:schemeClr>
+              </a:gs>
+              <a:gs pos="0">
+                <a:srgbClr val="48C0A7"/>
+              </a:gs>
+              <a:gs pos="100000">
+                <a:schemeClr val="accent1">
+                  <a:shade val="67500"/>
+                  <a:satMod val="115000"/>
+                </a:schemeClr>
+              </a:gs>
+              <a:gs pos="100000">
+                <a:schemeClr val="accent1">
+                  <a:shade val="100000"/>
+                  <a:satMod val="115000"/>
+                </a:schemeClr>
+              </a:gs>
+            </a:gsLst>
+            <a:lin ang="10800000" scaled="1"/>
+          </a:gradFill>
+          <a:ln>
+            <a:noFill/>
+          </a:ln>
+        </p:spPr>
+        <p:style>
+          <a:lnRef idx="2">
+            <a:schemeClr val="accent1">
+              <a:shade val="15000"/>
+            </a:schemeClr>
+          </a:lnRef>
+          <a:fillRef idx="1">
+            <a:schemeClr val="accent1"/>
+          </a:fillRef>
+          <a:effectRef idx="0">
+            <a:schemeClr val="accent1"/>
+          </a:effectRef>
+          <a:fontRef idx="minor">
+            <a:schemeClr val="lt1"/>
+          </a:fontRef>
+        </p:style>
+        <p:txBody>
+          <a:bodyPr rtlCol="0" anchor="ctr"/>
+          <a:lstStyle/>
+          <a:p>
+            <a:pPr algn="ctr"/>
+            <a:endParaRPr lang="en-DE"/>
+          </a:p>
+        </p:txBody>
+      </p:sp>
     </p:spTree>
     <p:extLst>
       <p:ext uri="{BB962C8B-B14F-4D97-AF65-F5344CB8AC3E}">
-        <p14:creationId xmlns:p14="http://schemas.microsoft.com/office/powerpoint/2010/main" val="918325201"/>
+        <p14:creationId xmlns:p14="http://schemas.microsoft.com/office/powerpoint/2010/main" val="869605112"/>
+      </p:ext>
+    </p:extLst>
+  </p:cSld>
+  <p:clrMapOvr>
+    <a:masterClrMapping/>
+  </p:clrMapOvr>
+  <p:timing>
+    <p:tnLst>
+      <p:par>
+        <p:cTn id="1" dur="indefinite" restart="never" nodeType="tmRoot">
+          <p:childTnLst>
+            <p:seq concurrent="1" nextAc="seek">
+              <p:cTn id="2" dur="indefinite" nodeType="mainSeq">
+                <p:childTnLst>
+                  <p:par>
+                    <p:cTn id="3" fill="hold">
+                      <p:stCondLst>
+                        <p:cond delay="indefinite"/>
+                      </p:stCondLst>
+                      <p:childTnLst>
+                        <p:par>
+                          <p:cTn id="4" fill="hold">
+                            <p:stCondLst>
+                              <p:cond delay="0"/>
+                            </p:stCondLst>
+                            <p:childTnLst>
+                              <p:par>
+                                <p:cTn id="5" presetID="1" presetClass="entr" presetSubtype="0" fill="hold" grpId="0" nodeType="clickEffect">
+                                  <p:stCondLst>
+                                    <p:cond delay="0"/>
+                                  </p:stCondLst>
+                                  <p:childTnLst>
+                                    <p:set>
+                                      <p:cBhvr>
+                                        <p:cTn id="6" dur="1" fill="hold">
+                                          <p:stCondLst>
+                                            <p:cond delay="0"/>
+                                          </p:stCondLst>
+                                        </p:cTn>
+                                        <p:tgtEl>
+                                          <p:spTgt spid="6"/>
+                                        </p:tgtEl>
+                                        <p:attrNameLst>
+                                          <p:attrName>style.visibility</p:attrName>
+                                        </p:attrNameLst>
+                                      </p:cBhvr>
+                                      <p:to>
+                                        <p:strVal val="visible"/>
+                                      </p:to>
+                                    </p:set>
+                                  </p:childTnLst>
+                                </p:cTn>
+                              </p:par>
+                              <p:par>
+                                <p:cTn id="7" presetID="1" presetClass="entr" presetSubtype="0" fill="hold" nodeType="withEffect">
+                                  <p:stCondLst>
+                                    <p:cond delay="0"/>
+                                  </p:stCondLst>
+                                  <p:childTnLst>
+                                    <p:set>
+                                      <p:cBhvr>
+                                        <p:cTn id="8" dur="1" fill="hold">
+                                          <p:stCondLst>
+                                            <p:cond delay="0"/>
+                                          </p:stCondLst>
+                                        </p:cTn>
+                                        <p:tgtEl>
+                                          <p:spTgt spid="1026"/>
+                                        </p:tgtEl>
+                                        <p:attrNameLst>
+                                          <p:attrName>style.visibility</p:attrName>
+                                        </p:attrNameLst>
+                                      </p:cBhvr>
+                                      <p:to>
+                                        <p:strVal val="visible"/>
+                                      </p:to>
+                                    </p:set>
+                                  </p:childTnLst>
+                                </p:cTn>
+                              </p:par>
+                            </p:childTnLst>
+                          </p:cTn>
+                        </p:par>
+                      </p:childTnLst>
+                    </p:cTn>
+                  </p:par>
+                  <p:par>
+                    <p:cTn id="9" fill="hold">
+                      <p:stCondLst>
+                        <p:cond delay="indefinite"/>
+                      </p:stCondLst>
+                      <p:childTnLst>
+                        <p:par>
+                          <p:cTn id="10" fill="hold">
+                            <p:stCondLst>
+                              <p:cond delay="0"/>
+                            </p:stCondLst>
+                            <p:childTnLst>
+                              <p:par>
+                                <p:cTn id="11" presetID="1" presetClass="entr" presetSubtype="0" fill="hold" grpId="0" nodeType="clickEffect">
+                                  <p:stCondLst>
+                                    <p:cond delay="0"/>
+                                  </p:stCondLst>
+                                  <p:childTnLst>
+                                    <p:set>
+                                      <p:cBhvr>
+                                        <p:cTn id="12" dur="1" fill="hold">
+                                          <p:stCondLst>
+                                            <p:cond delay="0"/>
+                                          </p:stCondLst>
+                                        </p:cTn>
+                                        <p:tgtEl>
+                                          <p:spTgt spid="7"/>
+                                        </p:tgtEl>
+                                        <p:attrNameLst>
+                                          <p:attrName>style.visibility</p:attrName>
+                                        </p:attrNameLst>
+                                      </p:cBhvr>
+                                      <p:to>
+                                        <p:strVal val="visible"/>
+                                      </p:to>
+                                    </p:set>
+                                  </p:childTnLst>
+                                </p:cTn>
+                              </p:par>
+                              <p:par>
+                                <p:cTn id="13" presetID="1" presetClass="entr" presetSubtype="0" fill="hold" grpId="0" nodeType="withEffect">
+                                  <p:stCondLst>
+                                    <p:cond delay="0"/>
+                                  </p:stCondLst>
+                                  <p:childTnLst>
+                                    <p:set>
+                                      <p:cBhvr>
+                                        <p:cTn id="14" dur="1" fill="hold">
+                                          <p:stCondLst>
+                                            <p:cond delay="0"/>
+                                          </p:stCondLst>
+                                        </p:cTn>
+                                        <p:tgtEl>
+                                          <p:spTgt spid="33"/>
+                                        </p:tgtEl>
+                                        <p:attrNameLst>
+                                          <p:attrName>style.visibility</p:attrName>
+                                        </p:attrNameLst>
+                                      </p:cBhvr>
+                                      <p:to>
+                                        <p:strVal val="visible"/>
+                                      </p:to>
+                                    </p:set>
+                                  </p:childTnLst>
+                                </p:cTn>
+                              </p:par>
+                            </p:childTnLst>
+                          </p:cTn>
+                        </p:par>
+                      </p:childTnLst>
+                    </p:cTn>
+                  </p:par>
+                  <p:par>
+                    <p:cTn id="15" fill="hold">
+                      <p:stCondLst>
+                        <p:cond delay="indefinite"/>
+                      </p:stCondLst>
+                      <p:childTnLst>
+                        <p:par>
+                          <p:cTn id="16" fill="hold">
+                            <p:stCondLst>
+                              <p:cond delay="0"/>
+                            </p:stCondLst>
+                            <p:childTnLst>
+                              <p:par>
+                                <p:cTn id="17" presetID="1" presetClass="entr" presetSubtype="0" fill="hold" grpId="0" nodeType="clickEffect">
+                                  <p:stCondLst>
+                                    <p:cond delay="0"/>
+                                  </p:stCondLst>
+                                  <p:childTnLst>
+                                    <p:set>
+                                      <p:cBhvr>
+                                        <p:cTn id="18" dur="1" fill="hold">
+                                          <p:stCondLst>
+                                            <p:cond delay="0"/>
+                                          </p:stCondLst>
+                                        </p:cTn>
+                                        <p:tgtEl>
+                                          <p:spTgt spid="8"/>
+                                        </p:tgtEl>
+                                        <p:attrNameLst>
+                                          <p:attrName>style.visibility</p:attrName>
+                                        </p:attrNameLst>
+                                      </p:cBhvr>
+                                      <p:to>
+                                        <p:strVal val="visible"/>
+                                      </p:to>
+                                    </p:set>
+                                  </p:childTnLst>
+                                </p:cTn>
+                              </p:par>
+                              <p:par>
+                                <p:cTn id="19" presetID="1" presetClass="entr" presetSubtype="0" fill="hold" nodeType="withEffect">
+                                  <p:stCondLst>
+                                    <p:cond delay="0"/>
+                                  </p:stCondLst>
+                                  <p:childTnLst>
+                                    <p:set>
+                                      <p:cBhvr>
+                                        <p:cTn id="20" dur="1" fill="hold">
+                                          <p:stCondLst>
+                                            <p:cond delay="0"/>
+                                          </p:stCondLst>
+                                        </p:cTn>
+                                        <p:tgtEl>
+                                          <p:spTgt spid="44"/>
+                                        </p:tgtEl>
+                                        <p:attrNameLst>
+                                          <p:attrName>style.visibility</p:attrName>
+                                        </p:attrNameLst>
+                                      </p:cBhvr>
+                                      <p:to>
+                                        <p:strVal val="visible"/>
+                                      </p:to>
+                                    </p:set>
+                                  </p:childTnLst>
+                                </p:cTn>
+                              </p:par>
+                            </p:childTnLst>
+                          </p:cTn>
+                        </p:par>
+                      </p:childTnLst>
+                    </p:cTn>
+                  </p:par>
+                </p:childTnLst>
+              </p:cTn>
+              <p:prevCondLst>
+                <p:cond evt="onPrev" delay="0">
+                  <p:tgtEl>
+                    <p:sldTgt/>
+                  </p:tgtEl>
+                </p:cond>
+              </p:prevCondLst>
+              <p:nextCondLst>
+                <p:cond evt="onNext" delay="0">
+                  <p:tgtEl>
+                    <p:sldTgt/>
+                  </p:tgtEl>
+                </p:cond>
+              </p:nextCondLst>
+            </p:seq>
+          </p:childTnLst>
+        </p:cTn>
+      </p:par>
+    </p:tnLst>
+    <p:bldLst>
+      <p:bldP spid="33" grpId="0"/>
+      <p:bldP spid="6" grpId="0" animBg="1"/>
+      <p:bldP spid="7" grpId="0" animBg="1"/>
+      <p:bldP spid="8" grpId="0" animBg="1"/>
+    </p:bldLst>
+  </p:timing>
+</p:sld>
+</file>
+
+<file path=ppt/slides/slide9.xml><?xml version="1.0" encoding="utf-8"?>
+<p:sld xmlns:a="http://schemas.openxmlformats.org/drawingml/2006/main" xmlns:r="http://schemas.openxmlformats.org/officeDocument/2006/relationships" xmlns:p="http://schemas.openxmlformats.org/presentationml/2006/main">
+  <p:cSld>
+    <p:spTree>
+      <p:nvGrpSpPr>
+        <p:cNvPr id="1" name="">
+          <a:extLst>
+            <a:ext uri="{FF2B5EF4-FFF2-40B4-BE49-F238E27FC236}">
+              <a16:creationId xmlns:a16="http://schemas.microsoft.com/office/drawing/2014/main" id="{49435192-82FE-9DF4-4D50-0CE1D37BFC22}"/>
+            </a:ext>
+          </a:extLst>
+        </p:cNvPr>
+        <p:cNvGrpSpPr/>
+        <p:nvPr/>
+      </p:nvGrpSpPr>
+      <p:grpSpPr>
+        <a:xfrm>
+          <a:off x="0" y="0"/>
+          <a:ext cx="0" cy="0"/>
+          <a:chOff x="0" y="0"/>
+          <a:chExt cx="0" cy="0"/>
+        </a:xfrm>
+      </p:grpSpPr>
+      <p:pic>
+        <p:nvPicPr>
+          <p:cNvPr id="13" name="Bildplatzhalter 12" descr="Ein Bild, das Schachfigur, Statue, Messing, Skulptur enthält.&#10;&#10;Beschreibung automatisch generiert.">
+            <a:extLst>
+              <a:ext uri="{FF2B5EF4-FFF2-40B4-BE49-F238E27FC236}">
+                <a16:creationId xmlns:a16="http://schemas.microsoft.com/office/drawing/2014/main" id="{A3F69BDF-A435-86EF-99F1-C5BA62DE993F}"/>
+              </a:ext>
+            </a:extLst>
+          </p:cNvPr>
+          <p:cNvPicPr>
+            <a:picLocks noGrp="1" noChangeAspect="1"/>
+          </p:cNvPicPr>
+          <p:nvPr>
+            <p:ph type="pic" sz="quarter" idx="13"/>
+          </p:nvPr>
+        </p:nvPicPr>
+        <p:blipFill>
+          <a:blip r:embed="rId2"/>
+          <a:srcRect t="21875" b="21875"/>
+          <a:stretch/>
+        </p:blipFill>
+        <p:spPr>
+          <a:xfrm>
+            <a:off x="0" y="0"/>
+            <a:ext cx="12192000" cy="6858000"/>
+          </a:xfrm>
+        </p:spPr>
+      </p:pic>
+      <p:sp>
+        <p:nvSpPr>
+          <p:cNvPr id="9" name="Rectangle 8">
+            <a:extLst>
+              <a:ext uri="{FF2B5EF4-FFF2-40B4-BE49-F238E27FC236}">
+                <a16:creationId xmlns:a16="http://schemas.microsoft.com/office/drawing/2014/main" id="{2144EBB6-D3CB-8277-789D-E227FAC97602}"/>
+              </a:ext>
+            </a:extLst>
+          </p:cNvPr>
+          <p:cNvSpPr/>
+          <p:nvPr/>
+        </p:nvSpPr>
+        <p:spPr>
+          <a:xfrm>
+            <a:off x="-379828" y="-436098"/>
+            <a:ext cx="13111090" cy="7779433"/>
+          </a:xfrm>
+          <a:prstGeom prst="rect">
+            <a:avLst/>
+          </a:prstGeom>
+          <a:solidFill>
+            <a:schemeClr val="bg1">
+              <a:alpha val="90000"/>
+            </a:schemeClr>
+          </a:solidFill>
+        </p:spPr>
+        <p:style>
+          <a:lnRef idx="2">
+            <a:schemeClr val="accent1">
+              <a:shade val="15000"/>
+            </a:schemeClr>
+          </a:lnRef>
+          <a:fillRef idx="1">
+            <a:schemeClr val="accent1"/>
+          </a:fillRef>
+          <a:effectRef idx="0">
+            <a:schemeClr val="accent1"/>
+          </a:effectRef>
+          <a:fontRef idx="minor">
+            <a:schemeClr val="lt1"/>
+          </a:fontRef>
+        </p:style>
+        <p:txBody>
+          <a:bodyPr rtlCol="0" anchor="ctr"/>
+          <a:lstStyle/>
+          <a:p>
+            <a:pPr algn="ctr"/>
+            <a:endParaRPr lang="en-DE"/>
+          </a:p>
+        </p:txBody>
+      </p:sp>
+      <p:sp>
+        <p:nvSpPr>
+          <p:cNvPr id="20" name="Text Placeholder 19">
+            <a:extLst>
+              <a:ext uri="{FF2B5EF4-FFF2-40B4-BE49-F238E27FC236}">
+                <a16:creationId xmlns:a16="http://schemas.microsoft.com/office/drawing/2014/main" id="{9D59C9AB-2123-86FD-727D-1494F6F55DE4}"/>
+              </a:ext>
+            </a:extLst>
+          </p:cNvPr>
+          <p:cNvSpPr>
+            <a:spLocks noGrp="1"/>
+          </p:cNvSpPr>
+          <p:nvPr>
+            <p:ph type="body" sz="quarter" idx="17"/>
+          </p:nvPr>
+        </p:nvSpPr>
+        <p:spPr>
+          <a:xfrm>
+            <a:off x="4165451" y="1269416"/>
+            <a:ext cx="1598515" cy="1681163"/>
+          </a:xfrm>
+        </p:spPr>
+        <p:txBody>
+          <a:bodyPr vert="horz" lIns="91440" tIns="45720" rIns="91440" bIns="45720" rtlCol="0" anchor="t">
+            <a:noAutofit/>
+          </a:bodyPr>
+          <a:lstStyle/>
+          <a:p>
+            <a:r>
+              <a:rPr lang="en-US" dirty="0"/>
+              <a:t>S</a:t>
+            </a:r>
+          </a:p>
+        </p:txBody>
+      </p:sp>
+      <p:sp>
+        <p:nvSpPr>
+          <p:cNvPr id="18" name="Text Placeholder 17">
+            <a:extLst>
+              <a:ext uri="{FF2B5EF4-FFF2-40B4-BE49-F238E27FC236}">
+                <a16:creationId xmlns:a16="http://schemas.microsoft.com/office/drawing/2014/main" id="{7DCA4D98-70E5-D0E4-BDA7-E2CEC1B13F1B}"/>
+              </a:ext>
+            </a:extLst>
+          </p:cNvPr>
+          <p:cNvSpPr>
+            <a:spLocks noGrp="1"/>
+          </p:cNvSpPr>
+          <p:nvPr>
+            <p:ph type="body" sz="quarter" idx="15"/>
+          </p:nvPr>
+        </p:nvSpPr>
+        <p:spPr>
+          <a:xfrm>
+            <a:off x="2827449" y="1330267"/>
+            <a:ext cx="1253665" cy="1681163"/>
+          </a:xfrm>
+        </p:spPr>
+        <p:txBody>
+          <a:bodyPr vert="horz" lIns="91440" tIns="45720" rIns="91440" bIns="45720" rtlCol="0" anchor="t">
+            <a:noAutofit/>
+          </a:bodyPr>
+          <a:lstStyle/>
+          <a:p>
+            <a:r>
+              <a:rPr lang="en-US" dirty="0"/>
+              <a:t>E</a:t>
+            </a:r>
+            <a:endParaRPr lang="en-US" dirty="0">
+              <a:ea typeface="Source Sans Pro"/>
+            </a:endParaRPr>
+          </a:p>
+        </p:txBody>
+      </p:sp>
+      <p:sp>
+        <p:nvSpPr>
+          <p:cNvPr id="17" name="Text Placeholder 16">
+            <a:extLst>
+              <a:ext uri="{FF2B5EF4-FFF2-40B4-BE49-F238E27FC236}">
+                <a16:creationId xmlns:a16="http://schemas.microsoft.com/office/drawing/2014/main" id="{594ACF0C-7D44-38B1-070B-A0749FC831A2}"/>
+              </a:ext>
+            </a:extLst>
+          </p:cNvPr>
+          <p:cNvSpPr>
+            <a:spLocks noGrp="1"/>
+          </p:cNvSpPr>
+          <p:nvPr>
+            <p:ph type="body" sz="quarter" idx="14"/>
+          </p:nvPr>
+        </p:nvSpPr>
+        <p:spPr>
+          <a:xfrm>
+            <a:off x="869501" y="490621"/>
+            <a:ext cx="1253665" cy="1681163"/>
+          </a:xfrm>
+        </p:spPr>
+        <p:txBody>
+          <a:bodyPr vert="horz" lIns="91440" tIns="45720" rIns="91440" bIns="45720" rtlCol="0" anchor="t">
+            <a:noAutofit/>
+          </a:bodyPr>
+          <a:lstStyle/>
+          <a:p>
+            <a:r>
+              <a:rPr lang="en-US" dirty="0">
+                <a:ea typeface="Source Sans Pro"/>
+              </a:rPr>
+              <a:t>C</a:t>
+            </a:r>
+          </a:p>
+        </p:txBody>
+      </p:sp>
+      <p:sp>
+        <p:nvSpPr>
+          <p:cNvPr id="19" name="Text Placeholder 18">
+            <a:extLst>
+              <a:ext uri="{FF2B5EF4-FFF2-40B4-BE49-F238E27FC236}">
+                <a16:creationId xmlns:a16="http://schemas.microsoft.com/office/drawing/2014/main" id="{F64FA16C-42F7-A1DA-6EDA-E373203B4747}"/>
+              </a:ext>
+            </a:extLst>
+          </p:cNvPr>
+          <p:cNvSpPr>
+            <a:spLocks noGrp="1"/>
+          </p:cNvSpPr>
+          <p:nvPr>
+            <p:ph type="body" sz="quarter" idx="16"/>
+          </p:nvPr>
+        </p:nvSpPr>
+        <p:spPr>
+          <a:xfrm>
+            <a:off x="3619153" y="991513"/>
+            <a:ext cx="1253665" cy="1681163"/>
+          </a:xfrm>
+        </p:spPr>
+        <p:txBody>
+          <a:bodyPr vert="horz" lIns="91440" tIns="45720" rIns="91440" bIns="45720" rtlCol="0" anchor="t">
+            <a:noAutofit/>
+          </a:bodyPr>
+          <a:lstStyle/>
+          <a:p>
+            <a:r>
+              <a:rPr lang="en-US" dirty="0"/>
+              <a:t>S</a:t>
+            </a:r>
+            <a:endParaRPr lang="en-US" dirty="0">
+              <a:ea typeface="Source Sans Pro"/>
+            </a:endParaRPr>
+          </a:p>
+        </p:txBody>
+      </p:sp>
+      <p:sp>
+        <p:nvSpPr>
+          <p:cNvPr id="32" name="Subtitle 31">
+            <a:extLst>
+              <a:ext uri="{FF2B5EF4-FFF2-40B4-BE49-F238E27FC236}">
+                <a16:creationId xmlns:a16="http://schemas.microsoft.com/office/drawing/2014/main" id="{C29C560E-6A10-3B13-D963-A8C7AD2841B7}"/>
+              </a:ext>
+            </a:extLst>
+          </p:cNvPr>
+          <p:cNvSpPr>
+            <a:spLocks noGrp="1"/>
+          </p:cNvSpPr>
+          <p:nvPr>
+            <p:ph type="subTitle" idx="1"/>
+          </p:nvPr>
+        </p:nvSpPr>
+        <p:spPr>
+          <a:xfrm>
+            <a:off x="7970418" y="5325276"/>
+            <a:ext cx="3677297" cy="682094"/>
+          </a:xfrm>
+        </p:spPr>
+        <p:txBody>
+          <a:bodyPr>
+            <a:normAutofit fontScale="85000" lnSpcReduction="20000"/>
+          </a:bodyPr>
+          <a:lstStyle/>
+          <a:p>
+            <a:r>
+              <a:rPr lang="en-US" dirty="0"/>
+              <a:t>Aaron </a:t>
+            </a:r>
+            <a:r>
+              <a:rPr lang="en-US" err="1"/>
+              <a:t>debebe</a:t>
+            </a:r>
+            <a:endParaRPr lang="en-US" dirty="0" err="1">
+              <a:ea typeface="Source Sans Pro"/>
+            </a:endParaRPr>
+          </a:p>
+          <a:p>
+            <a:r>
+              <a:rPr lang="en-US" dirty="0">
+                <a:ea typeface="Source Sans Pro"/>
+              </a:rPr>
+              <a:t>Constantin Schreyer</a:t>
+            </a:r>
+          </a:p>
+        </p:txBody>
+      </p:sp>
+      <p:cxnSp>
+        <p:nvCxnSpPr>
+          <p:cNvPr id="12" name="Straight Connector 11">
+            <a:extLst>
+              <a:ext uri="{FF2B5EF4-FFF2-40B4-BE49-F238E27FC236}">
+                <a16:creationId xmlns:a16="http://schemas.microsoft.com/office/drawing/2014/main" id="{AB95E5D3-8CE5-5BFC-5765-3934E0DD8B60}"/>
+              </a:ext>
+              <a:ext uri="{C183D7F6-B498-43B3-948B-1728B52AA6E4}">
+                <adec:decorative xmlns:adec="http://schemas.microsoft.com/office/drawing/2017/decorative" val="1"/>
+              </a:ext>
+            </a:extLst>
+          </p:cNvPr>
+          <p:cNvCxnSpPr>
+            <a:cxnSpLocks/>
+          </p:cNvCxnSpPr>
+          <p:nvPr/>
+        </p:nvCxnSpPr>
+        <p:spPr>
+          <a:xfrm flipH="1">
+            <a:off x="4245428" y="5655432"/>
+            <a:ext cx="3318888" cy="0"/>
+          </a:xfrm>
+          <a:prstGeom prst="line">
+            <a:avLst/>
+          </a:prstGeom>
+          <a:ln w="19050">
+            <a:solidFill>
+              <a:schemeClr val="accent1"/>
+            </a:solidFill>
+          </a:ln>
+        </p:spPr>
+        <p:style>
+          <a:lnRef idx="1">
+            <a:schemeClr val="accent1"/>
+          </a:lnRef>
+          <a:fillRef idx="0">
+            <a:schemeClr val="accent1"/>
+          </a:fillRef>
+          <a:effectRef idx="0">
+            <a:schemeClr val="accent1"/>
+          </a:effectRef>
+          <a:fontRef idx="minor">
+            <a:schemeClr val="tx1"/>
+          </a:fontRef>
+        </p:style>
+      </p:cxnSp>
+      <p:sp>
+        <p:nvSpPr>
+          <p:cNvPr id="3" name="Text Placeholder 16">
+            <a:extLst>
+              <a:ext uri="{FF2B5EF4-FFF2-40B4-BE49-F238E27FC236}">
+                <a16:creationId xmlns:a16="http://schemas.microsoft.com/office/drawing/2014/main" id="{30F3025A-BE2C-DD62-6B2D-153509AAC78B}"/>
+              </a:ext>
+            </a:extLst>
+          </p:cNvPr>
+          <p:cNvSpPr txBox="1">
+            <a:spLocks/>
+          </p:cNvSpPr>
+          <p:nvPr/>
+        </p:nvSpPr>
+        <p:spPr>
+          <a:xfrm>
+            <a:off x="1895803" y="850839"/>
+            <a:ext cx="1253665" cy="1681163"/>
+          </a:xfrm>
+          <a:prstGeom prst="rect">
+            <a:avLst/>
+          </a:prstGeom>
+        </p:spPr>
+        <p:txBody>
+          <a:bodyPr vert="horz" lIns="91440" tIns="45720" rIns="91440" bIns="45720" rtlCol="0" anchor="t">
+            <a:noAutofit/>
+          </a:bodyPr>
+          <a:lstStyle>
+            <a:lvl1pPr marL="0" indent="0" algn="l" defTabSz="914400" rtl="0" eaLnBrk="1" latinLnBrk="0" hangingPunct="1">
+              <a:lnSpc>
+                <a:spcPct val="90000"/>
+              </a:lnSpc>
+              <a:spcBef>
+                <a:spcPts val="1000"/>
+              </a:spcBef>
+              <a:buFont typeface="Arial" panose="020B0604020202020204" pitchFamily="34" charset="0"/>
+              <a:buNone/>
+              <a:defRPr sz="15500" b="1" kern="1200">
+                <a:solidFill>
+                  <a:schemeClr val="tx1"/>
+                </a:solidFill>
+                <a:latin typeface="+mn-lt"/>
+                <a:ea typeface="+mn-ea"/>
+                <a:cs typeface="+mn-cs"/>
+              </a:defRPr>
+            </a:lvl1pPr>
+            <a:lvl2pPr marL="685800" indent="-228600" algn="l" defTabSz="914400" rtl="0" eaLnBrk="1" latinLnBrk="0" hangingPunct="1">
+              <a:lnSpc>
+                <a:spcPct val="90000"/>
+              </a:lnSpc>
+              <a:spcBef>
+                <a:spcPts val="500"/>
+              </a:spcBef>
+              <a:buFont typeface="Arial" panose="020B0604020202020204" pitchFamily="34" charset="0"/>
+              <a:buChar char="•"/>
+              <a:defRPr sz="2400" kern="1200">
+                <a:solidFill>
+                  <a:schemeClr val="tx1"/>
+                </a:solidFill>
+                <a:latin typeface="+mn-lt"/>
+                <a:ea typeface="+mn-ea"/>
+                <a:cs typeface="+mn-cs"/>
+              </a:defRPr>
+            </a:lvl2pPr>
+            <a:lvl3pPr marL="1143000" indent="-228600" algn="l" defTabSz="914400" rtl="0" eaLnBrk="1" latinLnBrk="0" hangingPunct="1">
+              <a:lnSpc>
+                <a:spcPct val="90000"/>
+              </a:lnSpc>
+              <a:spcBef>
+                <a:spcPts val="500"/>
+              </a:spcBef>
+              <a:buFont typeface="Arial" panose="020B0604020202020204" pitchFamily="34" charset="0"/>
+              <a:buChar char="•"/>
+              <a:defRPr sz="2000" kern="1200">
+                <a:solidFill>
+                  <a:schemeClr val="tx1"/>
+                </a:solidFill>
+                <a:latin typeface="+mn-lt"/>
+                <a:ea typeface="+mn-ea"/>
+                <a:cs typeface="+mn-cs"/>
+              </a:defRPr>
+            </a:lvl3pPr>
+            <a:lvl4pPr marL="1600200" indent="-228600" algn="l" defTabSz="914400" rtl="0" eaLnBrk="1" latinLnBrk="0" hangingPunct="1">
+              <a:lnSpc>
+                <a:spcPct val="90000"/>
+              </a:lnSpc>
+              <a:spcBef>
+                <a:spcPts val="500"/>
+              </a:spcBef>
+              <a:buFont typeface="Arial" panose="020B0604020202020204" pitchFamily="34" charset="0"/>
+              <a:buChar char="•"/>
+              <a:defRPr sz="1800" kern="1200">
+                <a:solidFill>
+                  <a:schemeClr val="tx1"/>
+                </a:solidFill>
+                <a:latin typeface="+mn-lt"/>
+                <a:ea typeface="+mn-ea"/>
+                <a:cs typeface="+mn-cs"/>
+              </a:defRPr>
+            </a:lvl4pPr>
+            <a:lvl5pPr marL="2057400" indent="-228600" algn="l" defTabSz="914400" rtl="0" eaLnBrk="1" latinLnBrk="0" hangingPunct="1">
+              <a:lnSpc>
+                <a:spcPct val="90000"/>
+              </a:lnSpc>
+              <a:spcBef>
+                <a:spcPts val="500"/>
+              </a:spcBef>
+              <a:buFont typeface="Arial" panose="020B0604020202020204" pitchFamily="34" charset="0"/>
+              <a:buChar char="•"/>
+              <a:defRPr sz="1800" kern="1200">
+                <a:solidFill>
+                  <a:schemeClr val="tx1"/>
+                </a:solidFill>
+                <a:latin typeface="+mn-lt"/>
+                <a:ea typeface="+mn-ea"/>
+                <a:cs typeface="+mn-cs"/>
+              </a:defRPr>
+            </a:lvl5pPr>
+            <a:lvl6pPr marL="2514600" indent="-228600" algn="l" defTabSz="914400" rtl="0" eaLnBrk="1" latinLnBrk="0" hangingPunct="1">
+              <a:lnSpc>
+                <a:spcPct val="90000"/>
+              </a:lnSpc>
+              <a:spcBef>
+                <a:spcPts val="500"/>
+              </a:spcBef>
+              <a:buFont typeface="Arial" panose="020B0604020202020204" pitchFamily="34" charset="0"/>
+              <a:buChar char="•"/>
+              <a:defRPr sz="1800" kern="1200">
+                <a:solidFill>
+                  <a:schemeClr val="tx1"/>
+                </a:solidFill>
+                <a:latin typeface="+mn-lt"/>
+                <a:ea typeface="+mn-ea"/>
+                <a:cs typeface="+mn-cs"/>
+              </a:defRPr>
+            </a:lvl6pPr>
+            <a:lvl7pPr marL="2971800" indent="-228600" algn="l" defTabSz="914400" rtl="0" eaLnBrk="1" latinLnBrk="0" hangingPunct="1">
+              <a:lnSpc>
+                <a:spcPct val="90000"/>
+              </a:lnSpc>
+              <a:spcBef>
+                <a:spcPts val="500"/>
+              </a:spcBef>
+              <a:buFont typeface="Arial" panose="020B0604020202020204" pitchFamily="34" charset="0"/>
+              <a:buChar char="•"/>
+              <a:defRPr sz="1800" kern="1200">
+                <a:solidFill>
+                  <a:schemeClr val="tx1"/>
+                </a:solidFill>
+                <a:latin typeface="+mn-lt"/>
+                <a:ea typeface="+mn-ea"/>
+                <a:cs typeface="+mn-cs"/>
+              </a:defRPr>
+            </a:lvl7pPr>
+            <a:lvl8pPr marL="3429000" indent="-228600" algn="l" defTabSz="914400" rtl="0" eaLnBrk="1" latinLnBrk="0" hangingPunct="1">
+              <a:lnSpc>
+                <a:spcPct val="90000"/>
+              </a:lnSpc>
+              <a:spcBef>
+                <a:spcPts val="500"/>
+              </a:spcBef>
+              <a:buFont typeface="Arial" panose="020B0604020202020204" pitchFamily="34" charset="0"/>
+              <a:buChar char="•"/>
+              <a:defRPr sz="1800" kern="1200">
+                <a:solidFill>
+                  <a:schemeClr val="tx1"/>
+                </a:solidFill>
+                <a:latin typeface="+mn-lt"/>
+                <a:ea typeface="+mn-ea"/>
+                <a:cs typeface="+mn-cs"/>
+              </a:defRPr>
+            </a:lvl8pPr>
+            <a:lvl9pPr marL="3886200" indent="-228600" algn="l" defTabSz="914400" rtl="0" eaLnBrk="1" latinLnBrk="0" hangingPunct="1">
+              <a:lnSpc>
+                <a:spcPct val="90000"/>
+              </a:lnSpc>
+              <a:spcBef>
+                <a:spcPts val="500"/>
+              </a:spcBef>
+              <a:buFont typeface="Arial" panose="020B0604020202020204" pitchFamily="34" charset="0"/>
+              <a:buChar char="•"/>
+              <a:defRPr sz="1800" kern="1200">
+                <a:solidFill>
+                  <a:schemeClr val="tx1"/>
+                </a:solidFill>
+                <a:latin typeface="+mn-lt"/>
+                <a:ea typeface="+mn-ea"/>
+                <a:cs typeface="+mn-cs"/>
+              </a:defRPr>
+            </a:lvl9pPr>
+          </a:lstStyle>
+          <a:p>
+            <a:r>
+              <a:rPr lang="en-US" dirty="0">
+                <a:ea typeface="Source Sans Pro"/>
+              </a:rPr>
+              <a:t>H</a:t>
+            </a:r>
+          </a:p>
+        </p:txBody>
+      </p:sp>
+      <p:sp>
+        <p:nvSpPr>
+          <p:cNvPr id="4" name="Text Placeholder 16">
+            <a:extLst>
+              <a:ext uri="{FF2B5EF4-FFF2-40B4-BE49-F238E27FC236}">
+                <a16:creationId xmlns:a16="http://schemas.microsoft.com/office/drawing/2014/main" id="{6ABCAC18-16F8-16E2-D890-8804C5B4F022}"/>
+              </a:ext>
+            </a:extLst>
+          </p:cNvPr>
+          <p:cNvSpPr txBox="1">
+            <a:spLocks/>
+          </p:cNvSpPr>
+          <p:nvPr/>
+        </p:nvSpPr>
+        <p:spPr>
+          <a:xfrm>
+            <a:off x="1322364" y="2084304"/>
+            <a:ext cx="1253665" cy="1681163"/>
+          </a:xfrm>
+          <a:prstGeom prst="rect">
+            <a:avLst/>
+          </a:prstGeom>
+        </p:spPr>
+        <p:txBody>
+          <a:bodyPr vert="horz" lIns="91440" tIns="45720" rIns="91440" bIns="45720" rtlCol="0" anchor="t">
+            <a:noAutofit/>
+          </a:bodyPr>
+          <a:lstStyle>
+            <a:lvl1pPr marL="0" indent="0" algn="l" defTabSz="914400" rtl="0" eaLnBrk="1" latinLnBrk="0" hangingPunct="1">
+              <a:lnSpc>
+                <a:spcPct val="90000"/>
+              </a:lnSpc>
+              <a:spcBef>
+                <a:spcPts val="1000"/>
+              </a:spcBef>
+              <a:buFont typeface="Arial" panose="020B0604020202020204" pitchFamily="34" charset="0"/>
+              <a:buNone/>
+              <a:defRPr sz="15500" b="1" kern="1200">
+                <a:solidFill>
+                  <a:schemeClr val="tx1"/>
+                </a:solidFill>
+                <a:latin typeface="+mn-lt"/>
+                <a:ea typeface="+mn-ea"/>
+                <a:cs typeface="+mn-cs"/>
+              </a:defRPr>
+            </a:lvl1pPr>
+            <a:lvl2pPr marL="685800" indent="-228600" algn="l" defTabSz="914400" rtl="0" eaLnBrk="1" latinLnBrk="0" hangingPunct="1">
+              <a:lnSpc>
+                <a:spcPct val="90000"/>
+              </a:lnSpc>
+              <a:spcBef>
+                <a:spcPts val="500"/>
+              </a:spcBef>
+              <a:buFont typeface="Arial" panose="020B0604020202020204" pitchFamily="34" charset="0"/>
+              <a:buChar char="•"/>
+              <a:defRPr sz="2400" kern="1200">
+                <a:solidFill>
+                  <a:schemeClr val="tx1"/>
+                </a:solidFill>
+                <a:latin typeface="+mn-lt"/>
+                <a:ea typeface="+mn-ea"/>
+                <a:cs typeface="+mn-cs"/>
+              </a:defRPr>
+            </a:lvl2pPr>
+            <a:lvl3pPr marL="1143000" indent="-228600" algn="l" defTabSz="914400" rtl="0" eaLnBrk="1" latinLnBrk="0" hangingPunct="1">
+              <a:lnSpc>
+                <a:spcPct val="90000"/>
+              </a:lnSpc>
+              <a:spcBef>
+                <a:spcPts val="500"/>
+              </a:spcBef>
+              <a:buFont typeface="Arial" panose="020B0604020202020204" pitchFamily="34" charset="0"/>
+              <a:buChar char="•"/>
+              <a:defRPr sz="2000" kern="1200">
+                <a:solidFill>
+                  <a:schemeClr val="tx1"/>
+                </a:solidFill>
+                <a:latin typeface="+mn-lt"/>
+                <a:ea typeface="+mn-ea"/>
+                <a:cs typeface="+mn-cs"/>
+              </a:defRPr>
+            </a:lvl3pPr>
+            <a:lvl4pPr marL="1600200" indent="-228600" algn="l" defTabSz="914400" rtl="0" eaLnBrk="1" latinLnBrk="0" hangingPunct="1">
+              <a:lnSpc>
+                <a:spcPct val="90000"/>
+              </a:lnSpc>
+              <a:spcBef>
+                <a:spcPts val="500"/>
+              </a:spcBef>
+              <a:buFont typeface="Arial" panose="020B0604020202020204" pitchFamily="34" charset="0"/>
+              <a:buChar char="•"/>
+              <a:defRPr sz="1800" kern="1200">
+                <a:solidFill>
+                  <a:schemeClr val="tx1"/>
+                </a:solidFill>
+                <a:latin typeface="+mn-lt"/>
+                <a:ea typeface="+mn-ea"/>
+                <a:cs typeface="+mn-cs"/>
+              </a:defRPr>
+            </a:lvl4pPr>
+            <a:lvl5pPr marL="2057400" indent="-228600" algn="l" defTabSz="914400" rtl="0" eaLnBrk="1" latinLnBrk="0" hangingPunct="1">
+              <a:lnSpc>
+                <a:spcPct val="90000"/>
+              </a:lnSpc>
+              <a:spcBef>
+                <a:spcPts val="500"/>
+              </a:spcBef>
+              <a:buFont typeface="Arial" panose="020B0604020202020204" pitchFamily="34" charset="0"/>
+              <a:buChar char="•"/>
+              <a:defRPr sz="1800" kern="1200">
+                <a:solidFill>
+                  <a:schemeClr val="tx1"/>
+                </a:solidFill>
+                <a:latin typeface="+mn-lt"/>
+                <a:ea typeface="+mn-ea"/>
+                <a:cs typeface="+mn-cs"/>
+              </a:defRPr>
+            </a:lvl5pPr>
+            <a:lvl6pPr marL="2514600" indent="-228600" algn="l" defTabSz="914400" rtl="0" eaLnBrk="1" latinLnBrk="0" hangingPunct="1">
+              <a:lnSpc>
+                <a:spcPct val="90000"/>
+              </a:lnSpc>
+              <a:spcBef>
+                <a:spcPts val="500"/>
+              </a:spcBef>
+              <a:buFont typeface="Arial" panose="020B0604020202020204" pitchFamily="34" charset="0"/>
+              <a:buChar char="•"/>
+              <a:defRPr sz="1800" kern="1200">
+                <a:solidFill>
+                  <a:schemeClr val="tx1"/>
+                </a:solidFill>
+                <a:latin typeface="+mn-lt"/>
+                <a:ea typeface="+mn-ea"/>
+                <a:cs typeface="+mn-cs"/>
+              </a:defRPr>
+            </a:lvl6pPr>
+            <a:lvl7pPr marL="2971800" indent="-228600" algn="l" defTabSz="914400" rtl="0" eaLnBrk="1" latinLnBrk="0" hangingPunct="1">
+              <a:lnSpc>
+                <a:spcPct val="90000"/>
+              </a:lnSpc>
+              <a:spcBef>
+                <a:spcPts val="500"/>
+              </a:spcBef>
+              <a:buFont typeface="Arial" panose="020B0604020202020204" pitchFamily="34" charset="0"/>
+              <a:buChar char="•"/>
+              <a:defRPr sz="1800" kern="1200">
+                <a:solidFill>
+                  <a:schemeClr val="tx1"/>
+                </a:solidFill>
+                <a:latin typeface="+mn-lt"/>
+                <a:ea typeface="+mn-ea"/>
+                <a:cs typeface="+mn-cs"/>
+              </a:defRPr>
+            </a:lvl7pPr>
+            <a:lvl8pPr marL="3429000" indent="-228600" algn="l" defTabSz="914400" rtl="0" eaLnBrk="1" latinLnBrk="0" hangingPunct="1">
+              <a:lnSpc>
+                <a:spcPct val="90000"/>
+              </a:lnSpc>
+              <a:spcBef>
+                <a:spcPts val="500"/>
+              </a:spcBef>
+              <a:buFont typeface="Arial" panose="020B0604020202020204" pitchFamily="34" charset="0"/>
+              <a:buChar char="•"/>
+              <a:defRPr sz="1800" kern="1200">
+                <a:solidFill>
+                  <a:schemeClr val="tx1"/>
+                </a:solidFill>
+                <a:latin typeface="+mn-lt"/>
+                <a:ea typeface="+mn-ea"/>
+                <a:cs typeface="+mn-cs"/>
+              </a:defRPr>
+            </a:lvl8pPr>
+            <a:lvl9pPr marL="3886200" indent="-228600" algn="l" defTabSz="914400" rtl="0" eaLnBrk="1" latinLnBrk="0" hangingPunct="1">
+              <a:lnSpc>
+                <a:spcPct val="90000"/>
+              </a:lnSpc>
+              <a:spcBef>
+                <a:spcPts val="500"/>
+              </a:spcBef>
+              <a:buFont typeface="Arial" panose="020B0604020202020204" pitchFamily="34" charset="0"/>
+              <a:buChar char="•"/>
+              <a:defRPr sz="1800" kern="1200">
+                <a:solidFill>
+                  <a:schemeClr val="tx1"/>
+                </a:solidFill>
+                <a:latin typeface="+mn-lt"/>
+                <a:ea typeface="+mn-ea"/>
+                <a:cs typeface="+mn-cs"/>
+              </a:defRPr>
+            </a:lvl9pPr>
+          </a:lstStyle>
+          <a:p>
+            <a:r>
+              <a:rPr lang="en-US" dirty="0">
+                <a:ea typeface="Source Sans Pro"/>
+              </a:rPr>
+              <a:t>F</a:t>
+            </a:r>
+            <a:endParaRPr lang="de-DE" dirty="0"/>
+          </a:p>
+        </p:txBody>
+      </p:sp>
+      <p:sp>
+        <p:nvSpPr>
+          <p:cNvPr id="5" name="Text Placeholder 16">
+            <a:extLst>
+              <a:ext uri="{FF2B5EF4-FFF2-40B4-BE49-F238E27FC236}">
+                <a16:creationId xmlns:a16="http://schemas.microsoft.com/office/drawing/2014/main" id="{2B3490F3-310B-75F3-246F-3908667F406A}"/>
+              </a:ext>
+            </a:extLst>
+          </p:cNvPr>
+          <p:cNvSpPr txBox="1">
+            <a:spLocks/>
+          </p:cNvSpPr>
+          <p:nvPr/>
+        </p:nvSpPr>
+        <p:spPr>
+          <a:xfrm>
+            <a:off x="2740900" y="2409417"/>
+            <a:ext cx="1253665" cy="1681163"/>
+          </a:xfrm>
+          <a:prstGeom prst="rect">
+            <a:avLst/>
+          </a:prstGeom>
+        </p:spPr>
+        <p:txBody>
+          <a:bodyPr vert="horz" lIns="91440" tIns="45720" rIns="91440" bIns="45720" rtlCol="0" anchor="t">
+            <a:noAutofit/>
+          </a:bodyPr>
+          <a:lstStyle>
+            <a:lvl1pPr marL="0" indent="0" algn="l" defTabSz="914400" rtl="0" eaLnBrk="1" latinLnBrk="0" hangingPunct="1">
+              <a:lnSpc>
+                <a:spcPct val="90000"/>
+              </a:lnSpc>
+              <a:spcBef>
+                <a:spcPts val="1000"/>
+              </a:spcBef>
+              <a:buFont typeface="Arial" panose="020B0604020202020204" pitchFamily="34" charset="0"/>
+              <a:buNone/>
+              <a:defRPr sz="15500" b="1" kern="1200">
+                <a:solidFill>
+                  <a:schemeClr val="tx1"/>
+                </a:solidFill>
+                <a:latin typeface="+mn-lt"/>
+                <a:ea typeface="+mn-ea"/>
+                <a:cs typeface="+mn-cs"/>
+              </a:defRPr>
+            </a:lvl1pPr>
+            <a:lvl2pPr marL="685800" indent="-228600" algn="l" defTabSz="914400" rtl="0" eaLnBrk="1" latinLnBrk="0" hangingPunct="1">
+              <a:lnSpc>
+                <a:spcPct val="90000"/>
+              </a:lnSpc>
+              <a:spcBef>
+                <a:spcPts val="500"/>
+              </a:spcBef>
+              <a:buFont typeface="Arial" panose="020B0604020202020204" pitchFamily="34" charset="0"/>
+              <a:buChar char="•"/>
+              <a:defRPr sz="2400" kern="1200">
+                <a:solidFill>
+                  <a:schemeClr val="tx1"/>
+                </a:solidFill>
+                <a:latin typeface="+mn-lt"/>
+                <a:ea typeface="+mn-ea"/>
+                <a:cs typeface="+mn-cs"/>
+              </a:defRPr>
+            </a:lvl2pPr>
+            <a:lvl3pPr marL="1143000" indent="-228600" algn="l" defTabSz="914400" rtl="0" eaLnBrk="1" latinLnBrk="0" hangingPunct="1">
+              <a:lnSpc>
+                <a:spcPct val="90000"/>
+              </a:lnSpc>
+              <a:spcBef>
+                <a:spcPts val="500"/>
+              </a:spcBef>
+              <a:buFont typeface="Arial" panose="020B0604020202020204" pitchFamily="34" charset="0"/>
+              <a:buChar char="•"/>
+              <a:defRPr sz="2000" kern="1200">
+                <a:solidFill>
+                  <a:schemeClr val="tx1"/>
+                </a:solidFill>
+                <a:latin typeface="+mn-lt"/>
+                <a:ea typeface="+mn-ea"/>
+                <a:cs typeface="+mn-cs"/>
+              </a:defRPr>
+            </a:lvl3pPr>
+            <a:lvl4pPr marL="1600200" indent="-228600" algn="l" defTabSz="914400" rtl="0" eaLnBrk="1" latinLnBrk="0" hangingPunct="1">
+              <a:lnSpc>
+                <a:spcPct val="90000"/>
+              </a:lnSpc>
+              <a:spcBef>
+                <a:spcPts val="500"/>
+              </a:spcBef>
+              <a:buFont typeface="Arial" panose="020B0604020202020204" pitchFamily="34" charset="0"/>
+              <a:buChar char="•"/>
+              <a:defRPr sz="1800" kern="1200">
+                <a:solidFill>
+                  <a:schemeClr val="tx1"/>
+                </a:solidFill>
+                <a:latin typeface="+mn-lt"/>
+                <a:ea typeface="+mn-ea"/>
+                <a:cs typeface="+mn-cs"/>
+              </a:defRPr>
+            </a:lvl4pPr>
+            <a:lvl5pPr marL="2057400" indent="-228600" algn="l" defTabSz="914400" rtl="0" eaLnBrk="1" latinLnBrk="0" hangingPunct="1">
+              <a:lnSpc>
+                <a:spcPct val="90000"/>
+              </a:lnSpc>
+              <a:spcBef>
+                <a:spcPts val="500"/>
+              </a:spcBef>
+              <a:buFont typeface="Arial" panose="020B0604020202020204" pitchFamily="34" charset="0"/>
+              <a:buChar char="•"/>
+              <a:defRPr sz="1800" kern="1200">
+                <a:solidFill>
+                  <a:schemeClr val="tx1"/>
+                </a:solidFill>
+                <a:latin typeface="+mn-lt"/>
+                <a:ea typeface="+mn-ea"/>
+                <a:cs typeface="+mn-cs"/>
+              </a:defRPr>
+            </a:lvl5pPr>
+            <a:lvl6pPr marL="2514600" indent="-228600" algn="l" defTabSz="914400" rtl="0" eaLnBrk="1" latinLnBrk="0" hangingPunct="1">
+              <a:lnSpc>
+                <a:spcPct val="90000"/>
+              </a:lnSpc>
+              <a:spcBef>
+                <a:spcPts val="500"/>
+              </a:spcBef>
+              <a:buFont typeface="Arial" panose="020B0604020202020204" pitchFamily="34" charset="0"/>
+              <a:buChar char="•"/>
+              <a:defRPr sz="1800" kern="1200">
+                <a:solidFill>
+                  <a:schemeClr val="tx1"/>
+                </a:solidFill>
+                <a:latin typeface="+mn-lt"/>
+                <a:ea typeface="+mn-ea"/>
+                <a:cs typeface="+mn-cs"/>
+              </a:defRPr>
+            </a:lvl6pPr>
+            <a:lvl7pPr marL="2971800" indent="-228600" algn="l" defTabSz="914400" rtl="0" eaLnBrk="1" latinLnBrk="0" hangingPunct="1">
+              <a:lnSpc>
+                <a:spcPct val="90000"/>
+              </a:lnSpc>
+              <a:spcBef>
+                <a:spcPts val="500"/>
+              </a:spcBef>
+              <a:buFont typeface="Arial" panose="020B0604020202020204" pitchFamily="34" charset="0"/>
+              <a:buChar char="•"/>
+              <a:defRPr sz="1800" kern="1200">
+                <a:solidFill>
+                  <a:schemeClr val="tx1"/>
+                </a:solidFill>
+                <a:latin typeface="+mn-lt"/>
+                <a:ea typeface="+mn-ea"/>
+                <a:cs typeface="+mn-cs"/>
+              </a:defRPr>
+            </a:lvl7pPr>
+            <a:lvl8pPr marL="3429000" indent="-228600" algn="l" defTabSz="914400" rtl="0" eaLnBrk="1" latinLnBrk="0" hangingPunct="1">
+              <a:lnSpc>
+                <a:spcPct val="90000"/>
+              </a:lnSpc>
+              <a:spcBef>
+                <a:spcPts val="500"/>
+              </a:spcBef>
+              <a:buFont typeface="Arial" panose="020B0604020202020204" pitchFamily="34" charset="0"/>
+              <a:buChar char="•"/>
+              <a:defRPr sz="1800" kern="1200">
+                <a:solidFill>
+                  <a:schemeClr val="tx1"/>
+                </a:solidFill>
+                <a:latin typeface="+mn-lt"/>
+                <a:ea typeface="+mn-ea"/>
+                <a:cs typeface="+mn-cs"/>
+              </a:defRPr>
+            </a:lvl8pPr>
+            <a:lvl9pPr marL="3886200" indent="-228600" algn="l" defTabSz="914400" rtl="0" eaLnBrk="1" latinLnBrk="0" hangingPunct="1">
+              <a:lnSpc>
+                <a:spcPct val="90000"/>
+              </a:lnSpc>
+              <a:spcBef>
+                <a:spcPts val="500"/>
+              </a:spcBef>
+              <a:buFont typeface="Arial" panose="020B0604020202020204" pitchFamily="34" charset="0"/>
+              <a:buChar char="•"/>
+              <a:defRPr sz="1800" kern="1200">
+                <a:solidFill>
+                  <a:schemeClr val="tx1"/>
+                </a:solidFill>
+                <a:latin typeface="+mn-lt"/>
+                <a:ea typeface="+mn-ea"/>
+                <a:cs typeface="+mn-cs"/>
+              </a:defRPr>
+            </a:lvl9pPr>
+          </a:lstStyle>
+          <a:p>
+            <a:r>
+              <a:rPr lang="en-US" dirty="0">
+                <a:ea typeface="Source Sans Pro"/>
+              </a:rPr>
+              <a:t>N</a:t>
+            </a:r>
+            <a:endParaRPr lang="de-DE" dirty="0"/>
+          </a:p>
+        </p:txBody>
+      </p:sp>
+      <p:sp>
+        <p:nvSpPr>
+          <p:cNvPr id="6" name="Text Placeholder 16">
+            <a:extLst>
+              <a:ext uri="{FF2B5EF4-FFF2-40B4-BE49-F238E27FC236}">
+                <a16:creationId xmlns:a16="http://schemas.microsoft.com/office/drawing/2014/main" id="{4E59CAC9-E50E-D9D5-BC12-1254C3F97007}"/>
+              </a:ext>
+            </a:extLst>
+          </p:cNvPr>
+          <p:cNvSpPr txBox="1">
+            <a:spLocks/>
+          </p:cNvSpPr>
+          <p:nvPr/>
+        </p:nvSpPr>
+        <p:spPr>
+          <a:xfrm>
+            <a:off x="1895803" y="2779349"/>
+            <a:ext cx="1253665" cy="1681163"/>
+          </a:xfrm>
+          <a:prstGeom prst="rect">
+            <a:avLst/>
+          </a:prstGeom>
+        </p:spPr>
+        <p:txBody>
+          <a:bodyPr vert="horz" lIns="91440" tIns="45720" rIns="91440" bIns="45720" rtlCol="0" anchor="t">
+            <a:noAutofit/>
+          </a:bodyPr>
+          <a:lstStyle>
+            <a:lvl1pPr marL="0" indent="0" algn="l" defTabSz="914400" rtl="0" eaLnBrk="1" latinLnBrk="0" hangingPunct="1">
+              <a:lnSpc>
+                <a:spcPct val="90000"/>
+              </a:lnSpc>
+              <a:spcBef>
+                <a:spcPts val="1000"/>
+              </a:spcBef>
+              <a:buFont typeface="Arial" panose="020B0604020202020204" pitchFamily="34" charset="0"/>
+              <a:buNone/>
+              <a:defRPr sz="15500" b="1" kern="1200">
+                <a:solidFill>
+                  <a:schemeClr val="tx1"/>
+                </a:solidFill>
+                <a:latin typeface="+mn-lt"/>
+                <a:ea typeface="+mn-ea"/>
+                <a:cs typeface="+mn-cs"/>
+              </a:defRPr>
+            </a:lvl1pPr>
+            <a:lvl2pPr marL="685800" indent="-228600" algn="l" defTabSz="914400" rtl="0" eaLnBrk="1" latinLnBrk="0" hangingPunct="1">
+              <a:lnSpc>
+                <a:spcPct val="90000"/>
+              </a:lnSpc>
+              <a:spcBef>
+                <a:spcPts val="500"/>
+              </a:spcBef>
+              <a:buFont typeface="Arial" panose="020B0604020202020204" pitchFamily="34" charset="0"/>
+              <a:buChar char="•"/>
+              <a:defRPr sz="2400" kern="1200">
+                <a:solidFill>
+                  <a:schemeClr val="tx1"/>
+                </a:solidFill>
+                <a:latin typeface="+mn-lt"/>
+                <a:ea typeface="+mn-ea"/>
+                <a:cs typeface="+mn-cs"/>
+              </a:defRPr>
+            </a:lvl2pPr>
+            <a:lvl3pPr marL="1143000" indent="-228600" algn="l" defTabSz="914400" rtl="0" eaLnBrk="1" latinLnBrk="0" hangingPunct="1">
+              <a:lnSpc>
+                <a:spcPct val="90000"/>
+              </a:lnSpc>
+              <a:spcBef>
+                <a:spcPts val="500"/>
+              </a:spcBef>
+              <a:buFont typeface="Arial" panose="020B0604020202020204" pitchFamily="34" charset="0"/>
+              <a:buChar char="•"/>
+              <a:defRPr sz="2000" kern="1200">
+                <a:solidFill>
+                  <a:schemeClr val="tx1"/>
+                </a:solidFill>
+                <a:latin typeface="+mn-lt"/>
+                <a:ea typeface="+mn-ea"/>
+                <a:cs typeface="+mn-cs"/>
+              </a:defRPr>
+            </a:lvl3pPr>
+            <a:lvl4pPr marL="1600200" indent="-228600" algn="l" defTabSz="914400" rtl="0" eaLnBrk="1" latinLnBrk="0" hangingPunct="1">
+              <a:lnSpc>
+                <a:spcPct val="90000"/>
+              </a:lnSpc>
+              <a:spcBef>
+                <a:spcPts val="500"/>
+              </a:spcBef>
+              <a:buFont typeface="Arial" panose="020B0604020202020204" pitchFamily="34" charset="0"/>
+              <a:buChar char="•"/>
+              <a:defRPr sz="1800" kern="1200">
+                <a:solidFill>
+                  <a:schemeClr val="tx1"/>
+                </a:solidFill>
+                <a:latin typeface="+mn-lt"/>
+                <a:ea typeface="+mn-ea"/>
+                <a:cs typeface="+mn-cs"/>
+              </a:defRPr>
+            </a:lvl4pPr>
+            <a:lvl5pPr marL="2057400" indent="-228600" algn="l" defTabSz="914400" rtl="0" eaLnBrk="1" latinLnBrk="0" hangingPunct="1">
+              <a:lnSpc>
+                <a:spcPct val="90000"/>
+              </a:lnSpc>
+              <a:spcBef>
+                <a:spcPts val="500"/>
+              </a:spcBef>
+              <a:buFont typeface="Arial" panose="020B0604020202020204" pitchFamily="34" charset="0"/>
+              <a:buChar char="•"/>
+              <a:defRPr sz="1800" kern="1200">
+                <a:solidFill>
+                  <a:schemeClr val="tx1"/>
+                </a:solidFill>
+                <a:latin typeface="+mn-lt"/>
+                <a:ea typeface="+mn-ea"/>
+                <a:cs typeface="+mn-cs"/>
+              </a:defRPr>
+            </a:lvl5pPr>
+            <a:lvl6pPr marL="2514600" indent="-228600" algn="l" defTabSz="914400" rtl="0" eaLnBrk="1" latinLnBrk="0" hangingPunct="1">
+              <a:lnSpc>
+                <a:spcPct val="90000"/>
+              </a:lnSpc>
+              <a:spcBef>
+                <a:spcPts val="500"/>
+              </a:spcBef>
+              <a:buFont typeface="Arial" panose="020B0604020202020204" pitchFamily="34" charset="0"/>
+              <a:buChar char="•"/>
+              <a:defRPr sz="1800" kern="1200">
+                <a:solidFill>
+                  <a:schemeClr val="tx1"/>
+                </a:solidFill>
+                <a:latin typeface="+mn-lt"/>
+                <a:ea typeface="+mn-ea"/>
+                <a:cs typeface="+mn-cs"/>
+              </a:defRPr>
+            </a:lvl6pPr>
+            <a:lvl7pPr marL="2971800" indent="-228600" algn="l" defTabSz="914400" rtl="0" eaLnBrk="1" latinLnBrk="0" hangingPunct="1">
+              <a:lnSpc>
+                <a:spcPct val="90000"/>
+              </a:lnSpc>
+              <a:spcBef>
+                <a:spcPts val="500"/>
+              </a:spcBef>
+              <a:buFont typeface="Arial" panose="020B0604020202020204" pitchFamily="34" charset="0"/>
+              <a:buChar char="•"/>
+              <a:defRPr sz="1800" kern="1200">
+                <a:solidFill>
+                  <a:schemeClr val="tx1"/>
+                </a:solidFill>
+                <a:latin typeface="+mn-lt"/>
+                <a:ea typeface="+mn-ea"/>
+                <a:cs typeface="+mn-cs"/>
+              </a:defRPr>
+            </a:lvl7pPr>
+            <a:lvl8pPr marL="3429000" indent="-228600" algn="l" defTabSz="914400" rtl="0" eaLnBrk="1" latinLnBrk="0" hangingPunct="1">
+              <a:lnSpc>
+                <a:spcPct val="90000"/>
+              </a:lnSpc>
+              <a:spcBef>
+                <a:spcPts val="500"/>
+              </a:spcBef>
+              <a:buFont typeface="Arial" panose="020B0604020202020204" pitchFamily="34" charset="0"/>
+              <a:buChar char="•"/>
+              <a:defRPr sz="1800" kern="1200">
+                <a:solidFill>
+                  <a:schemeClr val="tx1"/>
+                </a:solidFill>
+                <a:latin typeface="+mn-lt"/>
+                <a:ea typeface="+mn-ea"/>
+                <a:cs typeface="+mn-cs"/>
+              </a:defRPr>
+            </a:lvl8pPr>
+            <a:lvl9pPr marL="3886200" indent="-228600" algn="l" defTabSz="914400" rtl="0" eaLnBrk="1" latinLnBrk="0" hangingPunct="1">
+              <a:lnSpc>
+                <a:spcPct val="90000"/>
+              </a:lnSpc>
+              <a:spcBef>
+                <a:spcPts val="500"/>
+              </a:spcBef>
+              <a:buFont typeface="Arial" panose="020B0604020202020204" pitchFamily="34" charset="0"/>
+              <a:buChar char="•"/>
+              <a:defRPr sz="1800" kern="1200">
+                <a:solidFill>
+                  <a:schemeClr val="tx1"/>
+                </a:solidFill>
+                <a:latin typeface="+mn-lt"/>
+                <a:ea typeface="+mn-ea"/>
+                <a:cs typeface="+mn-cs"/>
+              </a:defRPr>
+            </a:lvl9pPr>
+          </a:lstStyle>
+          <a:p>
+            <a:r>
+              <a:rPr lang="en-US" dirty="0">
+                <a:ea typeface="Source Sans Pro"/>
+              </a:rPr>
+              <a:t>E</a:t>
+            </a:r>
+            <a:endParaRPr lang="de-DE" dirty="0"/>
+          </a:p>
+        </p:txBody>
+      </p:sp>
+      <p:cxnSp>
+        <p:nvCxnSpPr>
+          <p:cNvPr id="10" name="Straight Connector 9">
+            <a:extLst>
+              <a:ext uri="{FF2B5EF4-FFF2-40B4-BE49-F238E27FC236}">
+                <a16:creationId xmlns:a16="http://schemas.microsoft.com/office/drawing/2014/main" id="{06745735-98C9-DB82-EAE0-E3982C3ECFF9}"/>
+              </a:ext>
+              <a:ext uri="{C183D7F6-B498-43B3-948B-1728B52AA6E4}">
+                <adec:decorative xmlns:adec="http://schemas.microsoft.com/office/drawing/2017/decorative" val="1"/>
+              </a:ext>
+            </a:extLst>
+          </p:cNvPr>
+          <p:cNvCxnSpPr>
+            <a:cxnSpLocks/>
+          </p:cNvCxnSpPr>
+          <p:nvPr/>
+        </p:nvCxnSpPr>
+        <p:spPr>
+          <a:xfrm flipV="1">
+            <a:off x="677714" y="824568"/>
+            <a:ext cx="0" cy="5339213"/>
+          </a:xfrm>
+          <a:prstGeom prst="line">
+            <a:avLst/>
+          </a:prstGeom>
+          <a:ln w="19050">
+            <a:solidFill>
+              <a:schemeClr val="accent1"/>
+            </a:solidFill>
+          </a:ln>
+        </p:spPr>
+        <p:style>
+          <a:lnRef idx="1">
+            <a:schemeClr val="accent1"/>
+          </a:lnRef>
+          <a:fillRef idx="0">
+            <a:schemeClr val="accent1"/>
+          </a:fillRef>
+          <a:effectRef idx="0">
+            <a:schemeClr val="accent1"/>
+          </a:effectRef>
+          <a:fontRef idx="minor">
+            <a:schemeClr val="tx1"/>
+          </a:fontRef>
+        </p:style>
+      </p:cxnSp>
+    </p:spTree>
+    <p:extLst>
+      <p:ext uri="{BB962C8B-B14F-4D97-AF65-F5344CB8AC3E}">
+        <p14:creationId xmlns:p14="http://schemas.microsoft.com/office/powerpoint/2010/main" val="3747000269"/>
       </p:ext>
     </p:extLst>
   </p:cSld>
@@ -23600,6 +23752,34 @@
 </file>
 
 <file path=customXml/item1.xml><?xml version="1.0" encoding="utf-8"?>
+<p:properties xmlns:p="http://schemas.microsoft.com/office/2006/metadata/properties" xmlns:xsi="http://www.w3.org/2001/XMLSchema-instance" xmlns:pc="http://schemas.microsoft.com/office/infopath/2007/PartnerControls">
+  <documentManagement>
+    <Status xmlns="71af3243-3dd4-4a8d-8c0d-dd76da1f02a5">Not started</Status>
+    <_ip_UnifiedCompliancePolicyUIAction xmlns="http://schemas.microsoft.com/sharepoint/v3" xsi:nil="true"/>
+    <Image xmlns="71af3243-3dd4-4a8d-8c0d-dd76da1f02a5">
+      <Url xsi:nil="true"/>
+      <Description xsi:nil="true"/>
+    </Image>
+    <_ip_UnifiedCompliancePolicyProperties xmlns="http://schemas.microsoft.com/sharepoint/v3" xsi:nil="true"/>
+    <ImageTagsTaxHTField xmlns="71af3243-3dd4-4a8d-8c0d-dd76da1f02a5">
+      <Terms xmlns="http://schemas.microsoft.com/office/infopath/2007/PartnerControls"/>
+    </ImageTagsTaxHTField>
+    <TaxCatchAll xmlns="230e9df3-be65-4c73-a93b-d1236ebd677e"/>
+    <MediaServiceKeyPoints xmlns="71af3243-3dd4-4a8d-8c0d-dd76da1f02a5" xsi:nil="true"/>
+  </documentManagement>
+</p:properties>
+</file>
+
+<file path=customXml/item2.xml><?xml version="1.0" encoding="utf-8"?>
+<?mso-contentType ?>
+<FormTemplates xmlns="http://schemas.microsoft.com/sharepoint/v3/contenttype/forms">
+  <Display>DocumentLibraryForm</Display>
+  <Edit>DocumentLibraryForm</Edit>
+  <New>DocumentLibraryForm</New>
+</FormTemplates>
+</file>
+
+<file path=customXml/item3.xml><?xml version="1.0" encoding="utf-8"?>
 <ct:contentTypeSchema xmlns:ct="http://schemas.microsoft.com/office/2006/metadata/contentType" xmlns:ma="http://schemas.microsoft.com/office/2006/metadata/properties/metaAttributes" ct:_="" ma:_="" ma:contentTypeName="Document" ma:contentTypeID="0x01010079F111ED35F8CC479449609E8A0923A6" ma:contentTypeVersion="21" ma:contentTypeDescription="Create a new document." ma:contentTypeScope="" ma:versionID="64dfb1555687e0874b4304b796b5b0c7">
   <xsd:schema xmlns:xsd="http://www.w3.org/2001/XMLSchema" xmlns:xs="http://www.w3.org/2001/XMLSchema" xmlns:p="http://schemas.microsoft.com/office/2006/metadata/properties" xmlns:ns1="http://schemas.microsoft.com/sharepoint/v3" xmlns:ns2="71af3243-3dd4-4a8d-8c0d-dd76da1f02a5" xmlns:ns3="16c05727-aa75-4e4a-9b5f-8a80a1165891" xmlns:ns4="230e9df3-be65-4c73-a93b-d1236ebd677e" targetNamespace="http://schemas.microsoft.com/office/2006/metadata/properties" ma:root="true" ma:fieldsID="e6e4c555b5e194d05b7203de9c4567b3" ns1:_="" ns2:_="" ns3:_="" ns4:_="">
     <xsd:import namespace="http://schemas.microsoft.com/sharepoint/v3"/>
@@ -23881,35 +24061,27 @@
 </ct:contentTypeSchema>
 </file>
 
-<file path=customXml/item2.xml><?xml version="1.0" encoding="utf-8"?>
-<?mso-contentType ?>
-<FormTemplates xmlns="http://schemas.microsoft.com/sharepoint/v3/contenttype/forms">
-  <Display>DocumentLibraryForm</Display>
-  <Edit>DocumentLibraryForm</Edit>
-  <New>DocumentLibraryForm</New>
-</FormTemplates>
+<file path=customXml/itemProps1.xml><?xml version="1.0" encoding="utf-8"?>
+<ds:datastoreItem xmlns:ds="http://schemas.openxmlformats.org/officeDocument/2006/customXml" ds:itemID="{8D126E60-8824-40C8-9624-5890E719C527}">
+  <ds:schemaRefs>
+    <ds:schemaRef ds:uri="http://schemas.microsoft.com/office/2006/metadata/properties"/>
+    <ds:schemaRef ds:uri="http://schemas.microsoft.com/office/infopath/2007/PartnerControls"/>
+    <ds:schemaRef ds:uri="71af3243-3dd4-4a8d-8c0d-dd76da1f02a5"/>
+    <ds:schemaRef ds:uri="http://schemas.microsoft.com/sharepoint/v3"/>
+    <ds:schemaRef ds:uri="230e9df3-be65-4c73-a93b-d1236ebd677e"/>
+  </ds:schemaRefs>
+</ds:datastoreItem>
 </file>
 
-<file path=customXml/item3.xml><?xml version="1.0" encoding="utf-8"?>
-<p:properties xmlns:p="http://schemas.microsoft.com/office/2006/metadata/properties" xmlns:xsi="http://www.w3.org/2001/XMLSchema-instance" xmlns:pc="http://schemas.microsoft.com/office/infopath/2007/PartnerControls">
-  <documentManagement>
-    <Status xmlns="71af3243-3dd4-4a8d-8c0d-dd76da1f02a5">Not started</Status>
-    <_ip_UnifiedCompliancePolicyUIAction xmlns="http://schemas.microsoft.com/sharepoint/v3" xsi:nil="true"/>
-    <Image xmlns="71af3243-3dd4-4a8d-8c0d-dd76da1f02a5">
-      <Url xsi:nil="true"/>
-      <Description xsi:nil="true"/>
-    </Image>
-    <_ip_UnifiedCompliancePolicyProperties xmlns="http://schemas.microsoft.com/sharepoint/v3" xsi:nil="true"/>
-    <ImageTagsTaxHTField xmlns="71af3243-3dd4-4a8d-8c0d-dd76da1f02a5">
-      <Terms xmlns="http://schemas.microsoft.com/office/infopath/2007/PartnerControls"/>
-    </ImageTagsTaxHTField>
-    <TaxCatchAll xmlns="230e9df3-be65-4c73-a93b-d1236ebd677e"/>
-    <MediaServiceKeyPoints xmlns="71af3243-3dd4-4a8d-8c0d-dd76da1f02a5" xsi:nil="true"/>
-  </documentManagement>
-</p:properties>
+<file path=customXml/itemProps2.xml><?xml version="1.0" encoding="utf-8"?>
+<ds:datastoreItem xmlns:ds="http://schemas.openxmlformats.org/officeDocument/2006/customXml" ds:itemID="{7817B950-985C-4D79-B0A3-FA5D2FD7806B}">
+  <ds:schemaRefs>
+    <ds:schemaRef ds:uri="http://schemas.microsoft.com/sharepoint/v3/contenttype/forms"/>
+  </ds:schemaRefs>
+</ds:datastoreItem>
 </file>
 
-<file path=customXml/itemProps1.xml><?xml version="1.0" encoding="utf-8"?>
+<file path=customXml/itemProps3.xml><?xml version="1.0" encoding="utf-8"?>
 <ds:datastoreItem xmlns:ds="http://schemas.openxmlformats.org/officeDocument/2006/customXml" ds:itemID="{472B6A28-7094-4F7C-9CE6-FEFFCFA7E15D}">
   <ds:schemaRefs>
     <ds:schemaRef ds:uri="http://schemas.microsoft.com/office/2006/metadata/contentType"/>
@@ -23930,26 +24102,6 @@
 </ds:datastoreItem>
 </file>
 
-<file path=customXml/itemProps2.xml><?xml version="1.0" encoding="utf-8"?>
-<ds:datastoreItem xmlns:ds="http://schemas.openxmlformats.org/officeDocument/2006/customXml" ds:itemID="{7817B950-985C-4D79-B0A3-FA5D2FD7806B}">
-  <ds:schemaRefs>
-    <ds:schemaRef ds:uri="http://schemas.microsoft.com/sharepoint/v3/contenttype/forms"/>
-  </ds:schemaRefs>
-</ds:datastoreItem>
-</file>
-
-<file path=customXml/itemProps3.xml><?xml version="1.0" encoding="utf-8"?>
-<ds:datastoreItem xmlns:ds="http://schemas.openxmlformats.org/officeDocument/2006/customXml" ds:itemID="{8D126E60-8824-40C8-9624-5890E719C527}">
-  <ds:schemaRefs>
-    <ds:schemaRef ds:uri="http://schemas.microsoft.com/office/2006/metadata/properties"/>
-    <ds:schemaRef ds:uri="http://schemas.microsoft.com/office/infopath/2007/PartnerControls"/>
-    <ds:schemaRef ds:uri="71af3243-3dd4-4a8d-8c0d-dd76da1f02a5"/>
-    <ds:schemaRef ds:uri="http://schemas.microsoft.com/sharepoint/v3"/>
-    <ds:schemaRef ds:uri="230e9df3-be65-4c73-a93b-d1236ebd677e"/>
-  </ds:schemaRefs>
-</ds:datastoreItem>
-</file>
-
 <file path=docMetadata/LabelInfo.xml><?xml version="1.0" encoding="utf-8"?>
 <clbl:labelList xmlns:clbl="http://schemas.microsoft.com/office/2020/mipLabelMetadata">
   <clbl:label id="{f42aa342-8706-4288-bd11-ebb85995028c}" enabled="1" method="Standard" siteId="{72f988bf-86f1-41af-91ab-2d7cd011db47}" removed="0"/>

</xml_diff>